<commit_message>
Added final exam stuff
</commit_message>
<xml_diff>
--- a/INFO6044/D2D/W_10_Script_2 (Lua)/Lua.C-registry.tables.lightdata.pptx
+++ b/INFO6044/D2D/W_10_Script_2 (Lua)/Lua.C-registry.tables.lightdata.pptx
@@ -225,7 +225,7 @@
             <a:fld id="{3D3F9196-5FBD-45F8-86BD-A3D90AC79AC7}" type="datetimeFigureOut">
               <a:rPr lang="en-CA" smtClean="0"/>
               <a:pPr/>
-              <a:t>2019-11-19</a:t>
+              <a:t>2022-12-01</a:t>
             </a:fld>
             <a:endParaRPr lang="en-CA" dirty="0"/>
           </a:p>
@@ -291,35 +291,35 @@
           <a:p>
             <a:pPr lvl="0"/>
             <a:r>
-              <a:rPr lang="en-US" smtClean="0"/>
+              <a:rPr lang="en-US"/>
               <a:t>Click to edit Master text styles</a:t>
             </a:r>
           </a:p>
           <a:p>
             <a:pPr lvl="1"/>
             <a:r>
-              <a:rPr lang="en-US" smtClean="0"/>
+              <a:rPr lang="en-US"/>
               <a:t>Second level</a:t>
             </a:r>
           </a:p>
           <a:p>
             <a:pPr lvl="2"/>
             <a:r>
-              <a:rPr lang="en-US" smtClean="0"/>
+              <a:rPr lang="en-US"/>
               <a:t>Third level</a:t>
             </a:r>
           </a:p>
           <a:p>
             <a:pPr lvl="3"/>
             <a:r>
-              <a:rPr lang="en-US" smtClean="0"/>
+              <a:rPr lang="en-US"/>
               <a:t>Fourth level</a:t>
             </a:r>
           </a:p>
           <a:p>
             <a:pPr lvl="4"/>
             <a:r>
-              <a:rPr lang="en-US" smtClean="0"/>
+              <a:rPr lang="en-US"/>
               <a:t>Fifth level</a:t>
             </a:r>
             <a:endParaRPr lang="en-CA"/>
@@ -870,7 +870,7 @@
           <a:lstStyle/>
           <a:p>
             <a:r>
-              <a:rPr lang="en-US" smtClean="0"/>
+              <a:rPr lang="en-US"/>
               <a:t>Click to edit Master title style</a:t>
             </a:r>
             <a:endParaRPr lang="en-CA"/>
@@ -989,7 +989,7 @@
           </a:lstStyle>
           <a:p>
             <a:r>
-              <a:rPr lang="en-US" smtClean="0"/>
+              <a:rPr lang="en-US"/>
               <a:t>Click to edit Master subtitle style</a:t>
             </a:r>
             <a:endParaRPr lang="en-CA"/>
@@ -1014,7 +1014,7 @@
             <a:fld id="{5B8DBE04-A610-4052-99FA-194876B9844B}" type="datetimeFigureOut">
               <a:rPr lang="en-CA" smtClean="0"/>
               <a:pPr/>
-              <a:t>2019-11-19</a:t>
+              <a:t>2022-12-01</a:t>
             </a:fld>
             <a:endParaRPr lang="en-CA" dirty="0"/>
           </a:p>
@@ -1104,7 +1104,7 @@
           <a:lstStyle/>
           <a:p>
             <a:r>
-              <a:rPr lang="en-US" smtClean="0"/>
+              <a:rPr lang="en-US"/>
               <a:t>Click to edit Master title style</a:t>
             </a:r>
             <a:endParaRPr lang="en-CA"/>
@@ -1128,35 +1128,35 @@
           <a:p>
             <a:pPr lvl="0"/>
             <a:r>
-              <a:rPr lang="en-US" smtClean="0"/>
+              <a:rPr lang="en-US"/>
               <a:t>Click to edit Master text styles</a:t>
             </a:r>
           </a:p>
           <a:p>
             <a:pPr lvl="1"/>
             <a:r>
-              <a:rPr lang="en-US" smtClean="0"/>
+              <a:rPr lang="en-US"/>
               <a:t>Second level</a:t>
             </a:r>
           </a:p>
           <a:p>
             <a:pPr lvl="2"/>
             <a:r>
-              <a:rPr lang="en-US" smtClean="0"/>
+              <a:rPr lang="en-US"/>
               <a:t>Third level</a:t>
             </a:r>
           </a:p>
           <a:p>
             <a:pPr lvl="3"/>
             <a:r>
-              <a:rPr lang="en-US" smtClean="0"/>
+              <a:rPr lang="en-US"/>
               <a:t>Fourth level</a:t>
             </a:r>
           </a:p>
           <a:p>
             <a:pPr lvl="4"/>
             <a:r>
-              <a:rPr lang="en-US" smtClean="0"/>
+              <a:rPr lang="en-US"/>
               <a:t>Fifth level</a:t>
             </a:r>
             <a:endParaRPr lang="en-CA"/>
@@ -1181,7 +1181,7 @@
             <a:fld id="{5B8DBE04-A610-4052-99FA-194876B9844B}" type="datetimeFigureOut">
               <a:rPr lang="en-CA" smtClean="0"/>
               <a:pPr/>
-              <a:t>2019-11-19</a:t>
+              <a:t>2022-12-01</a:t>
             </a:fld>
             <a:endParaRPr lang="en-CA" dirty="0"/>
           </a:p>
@@ -1276,7 +1276,7 @@
           <a:lstStyle/>
           <a:p>
             <a:r>
-              <a:rPr lang="en-US" smtClean="0"/>
+              <a:rPr lang="en-US"/>
               <a:t>Click to edit Master title style</a:t>
             </a:r>
             <a:endParaRPr lang="en-CA"/>
@@ -1305,35 +1305,35 @@
           <a:p>
             <a:pPr lvl="0"/>
             <a:r>
-              <a:rPr lang="en-US" smtClean="0"/>
+              <a:rPr lang="en-US"/>
               <a:t>Click to edit Master text styles</a:t>
             </a:r>
           </a:p>
           <a:p>
             <a:pPr lvl="1"/>
             <a:r>
-              <a:rPr lang="en-US" smtClean="0"/>
+              <a:rPr lang="en-US"/>
               <a:t>Second level</a:t>
             </a:r>
           </a:p>
           <a:p>
             <a:pPr lvl="2"/>
             <a:r>
-              <a:rPr lang="en-US" smtClean="0"/>
+              <a:rPr lang="en-US"/>
               <a:t>Third level</a:t>
             </a:r>
           </a:p>
           <a:p>
             <a:pPr lvl="3"/>
             <a:r>
-              <a:rPr lang="en-US" smtClean="0"/>
+              <a:rPr lang="en-US"/>
               <a:t>Fourth level</a:t>
             </a:r>
           </a:p>
           <a:p>
             <a:pPr lvl="4"/>
             <a:r>
-              <a:rPr lang="en-US" smtClean="0"/>
+              <a:rPr lang="en-US"/>
               <a:t>Fifth level</a:t>
             </a:r>
             <a:endParaRPr lang="en-CA"/>
@@ -1358,7 +1358,7 @@
             <a:fld id="{5B8DBE04-A610-4052-99FA-194876B9844B}" type="datetimeFigureOut">
               <a:rPr lang="en-CA" smtClean="0"/>
               <a:pPr/>
-              <a:t>2019-11-19</a:t>
+              <a:t>2022-12-01</a:t>
             </a:fld>
             <a:endParaRPr lang="en-CA" dirty="0"/>
           </a:p>
@@ -1448,7 +1448,7 @@
           <a:lstStyle/>
           <a:p>
             <a:r>
-              <a:rPr lang="en-US" smtClean="0"/>
+              <a:rPr lang="en-US"/>
               <a:t>Click to edit Master title style</a:t>
             </a:r>
             <a:endParaRPr lang="en-CA"/>
@@ -1472,35 +1472,35 @@
           <a:p>
             <a:pPr lvl="0"/>
             <a:r>
-              <a:rPr lang="en-US" smtClean="0"/>
+              <a:rPr lang="en-US"/>
               <a:t>Click to edit Master text styles</a:t>
             </a:r>
           </a:p>
           <a:p>
             <a:pPr lvl="1"/>
             <a:r>
-              <a:rPr lang="en-US" smtClean="0"/>
+              <a:rPr lang="en-US"/>
               <a:t>Second level</a:t>
             </a:r>
           </a:p>
           <a:p>
             <a:pPr lvl="2"/>
             <a:r>
-              <a:rPr lang="en-US" smtClean="0"/>
+              <a:rPr lang="en-US"/>
               <a:t>Third level</a:t>
             </a:r>
           </a:p>
           <a:p>
             <a:pPr lvl="3"/>
             <a:r>
-              <a:rPr lang="en-US" smtClean="0"/>
+              <a:rPr lang="en-US"/>
               <a:t>Fourth level</a:t>
             </a:r>
           </a:p>
           <a:p>
             <a:pPr lvl="4"/>
             <a:r>
-              <a:rPr lang="en-US" smtClean="0"/>
+              <a:rPr lang="en-US"/>
               <a:t>Fifth level</a:t>
             </a:r>
             <a:endParaRPr lang="en-CA"/>
@@ -1525,7 +1525,7 @@
             <a:fld id="{5B8DBE04-A610-4052-99FA-194876B9844B}" type="datetimeFigureOut">
               <a:rPr lang="en-CA" smtClean="0"/>
               <a:pPr/>
-              <a:t>2019-11-19</a:t>
+              <a:t>2022-12-01</a:t>
             </a:fld>
             <a:endParaRPr lang="en-CA" dirty="0"/>
           </a:p>
@@ -1624,7 +1624,7 @@
           </a:lstStyle>
           <a:p>
             <a:r>
-              <a:rPr lang="en-US" smtClean="0"/>
+              <a:rPr lang="en-US"/>
               <a:t>Click to edit Master title style</a:t>
             </a:r>
             <a:endParaRPr lang="en-CA"/>
@@ -1744,7 +1744,7 @@
           <a:p>
             <a:pPr lvl="0"/>
             <a:r>
-              <a:rPr lang="en-US" smtClean="0"/>
+              <a:rPr lang="en-US"/>
               <a:t>Click to edit Master text styles</a:t>
             </a:r>
           </a:p>
@@ -1768,7 +1768,7 @@
             <a:fld id="{5B8DBE04-A610-4052-99FA-194876B9844B}" type="datetimeFigureOut">
               <a:rPr lang="en-CA" smtClean="0"/>
               <a:pPr/>
-              <a:t>2019-11-19</a:t>
+              <a:t>2022-12-01</a:t>
             </a:fld>
             <a:endParaRPr lang="en-CA" dirty="0"/>
           </a:p>
@@ -1858,7 +1858,7 @@
           <a:lstStyle/>
           <a:p>
             <a:r>
-              <a:rPr lang="en-US" smtClean="0"/>
+              <a:rPr lang="en-US"/>
               <a:t>Click to edit Master title style</a:t>
             </a:r>
             <a:endParaRPr lang="en-CA"/>
@@ -1915,35 +1915,35 @@
           <a:p>
             <a:pPr lvl="0"/>
             <a:r>
-              <a:rPr lang="en-US" smtClean="0"/>
+              <a:rPr lang="en-US"/>
               <a:t>Click to edit Master text styles</a:t>
             </a:r>
           </a:p>
           <a:p>
             <a:pPr lvl="1"/>
             <a:r>
-              <a:rPr lang="en-US" smtClean="0"/>
+              <a:rPr lang="en-US"/>
               <a:t>Second level</a:t>
             </a:r>
           </a:p>
           <a:p>
             <a:pPr lvl="2"/>
             <a:r>
-              <a:rPr lang="en-US" smtClean="0"/>
+              <a:rPr lang="en-US"/>
               <a:t>Third level</a:t>
             </a:r>
           </a:p>
           <a:p>
             <a:pPr lvl="3"/>
             <a:r>
-              <a:rPr lang="en-US" smtClean="0"/>
+              <a:rPr lang="en-US"/>
               <a:t>Fourth level</a:t>
             </a:r>
           </a:p>
           <a:p>
             <a:pPr lvl="4"/>
             <a:r>
-              <a:rPr lang="en-US" smtClean="0"/>
+              <a:rPr lang="en-US"/>
               <a:t>Fifth level</a:t>
             </a:r>
             <a:endParaRPr lang="en-CA"/>
@@ -2000,35 +2000,35 @@
           <a:p>
             <a:pPr lvl="0"/>
             <a:r>
-              <a:rPr lang="en-US" smtClean="0"/>
+              <a:rPr lang="en-US"/>
               <a:t>Click to edit Master text styles</a:t>
             </a:r>
           </a:p>
           <a:p>
             <a:pPr lvl="1"/>
             <a:r>
-              <a:rPr lang="en-US" smtClean="0"/>
+              <a:rPr lang="en-US"/>
               <a:t>Second level</a:t>
             </a:r>
           </a:p>
           <a:p>
             <a:pPr lvl="2"/>
             <a:r>
-              <a:rPr lang="en-US" smtClean="0"/>
+              <a:rPr lang="en-US"/>
               <a:t>Third level</a:t>
             </a:r>
           </a:p>
           <a:p>
             <a:pPr lvl="3"/>
             <a:r>
-              <a:rPr lang="en-US" smtClean="0"/>
+              <a:rPr lang="en-US"/>
               <a:t>Fourth level</a:t>
             </a:r>
           </a:p>
           <a:p>
             <a:pPr lvl="4"/>
             <a:r>
-              <a:rPr lang="en-US" smtClean="0"/>
+              <a:rPr lang="en-US"/>
               <a:t>Fifth level</a:t>
             </a:r>
             <a:endParaRPr lang="en-CA"/>
@@ -2053,7 +2053,7 @@
             <a:fld id="{5B8DBE04-A610-4052-99FA-194876B9844B}" type="datetimeFigureOut">
               <a:rPr lang="en-CA" smtClean="0"/>
               <a:pPr/>
-              <a:t>2019-11-19</a:t>
+              <a:t>2022-12-01</a:t>
             </a:fld>
             <a:endParaRPr lang="en-CA" dirty="0"/>
           </a:p>
@@ -2152,7 +2152,7 @@
           </a:lstStyle>
           <a:p>
             <a:r>
-              <a:rPr lang="en-US" smtClean="0"/>
+              <a:rPr lang="en-US"/>
               <a:t>Click to edit Master title style</a:t>
             </a:r>
             <a:endParaRPr lang="en-CA"/>
@@ -2218,7 +2218,7 @@
           <a:p>
             <a:pPr lvl="0"/>
             <a:r>
-              <a:rPr lang="en-US" smtClean="0"/>
+              <a:rPr lang="en-US"/>
               <a:t>Click to edit Master text styles</a:t>
             </a:r>
           </a:p>
@@ -2274,35 +2274,35 @@
           <a:p>
             <a:pPr lvl="0"/>
             <a:r>
-              <a:rPr lang="en-US" smtClean="0"/>
+              <a:rPr lang="en-US"/>
               <a:t>Click to edit Master text styles</a:t>
             </a:r>
           </a:p>
           <a:p>
             <a:pPr lvl="1"/>
             <a:r>
-              <a:rPr lang="en-US" smtClean="0"/>
+              <a:rPr lang="en-US"/>
               <a:t>Second level</a:t>
             </a:r>
           </a:p>
           <a:p>
             <a:pPr lvl="2"/>
             <a:r>
-              <a:rPr lang="en-US" smtClean="0"/>
+              <a:rPr lang="en-US"/>
               <a:t>Third level</a:t>
             </a:r>
           </a:p>
           <a:p>
             <a:pPr lvl="3"/>
             <a:r>
-              <a:rPr lang="en-US" smtClean="0"/>
+              <a:rPr lang="en-US"/>
               <a:t>Fourth level</a:t>
             </a:r>
           </a:p>
           <a:p>
             <a:pPr lvl="4"/>
             <a:r>
-              <a:rPr lang="en-US" smtClean="0"/>
+              <a:rPr lang="en-US"/>
               <a:t>Fifth level</a:t>
             </a:r>
             <a:endParaRPr lang="en-CA"/>
@@ -2368,7 +2368,7 @@
           <a:p>
             <a:pPr lvl="0"/>
             <a:r>
-              <a:rPr lang="en-US" smtClean="0"/>
+              <a:rPr lang="en-US"/>
               <a:t>Click to edit Master text styles</a:t>
             </a:r>
           </a:p>
@@ -2424,35 +2424,35 @@
           <a:p>
             <a:pPr lvl="0"/>
             <a:r>
-              <a:rPr lang="en-US" smtClean="0"/>
+              <a:rPr lang="en-US"/>
               <a:t>Click to edit Master text styles</a:t>
             </a:r>
           </a:p>
           <a:p>
             <a:pPr lvl="1"/>
             <a:r>
-              <a:rPr lang="en-US" smtClean="0"/>
+              <a:rPr lang="en-US"/>
               <a:t>Second level</a:t>
             </a:r>
           </a:p>
           <a:p>
             <a:pPr lvl="2"/>
             <a:r>
-              <a:rPr lang="en-US" smtClean="0"/>
+              <a:rPr lang="en-US"/>
               <a:t>Third level</a:t>
             </a:r>
           </a:p>
           <a:p>
             <a:pPr lvl="3"/>
             <a:r>
-              <a:rPr lang="en-US" smtClean="0"/>
+              <a:rPr lang="en-US"/>
               <a:t>Fourth level</a:t>
             </a:r>
           </a:p>
           <a:p>
             <a:pPr lvl="4"/>
             <a:r>
-              <a:rPr lang="en-US" smtClean="0"/>
+              <a:rPr lang="en-US"/>
               <a:t>Fifth level</a:t>
             </a:r>
             <a:endParaRPr lang="en-CA"/>
@@ -2477,7 +2477,7 @@
             <a:fld id="{5B8DBE04-A610-4052-99FA-194876B9844B}" type="datetimeFigureOut">
               <a:rPr lang="en-CA" smtClean="0"/>
               <a:pPr/>
-              <a:t>2019-11-19</a:t>
+              <a:t>2022-12-01</a:t>
             </a:fld>
             <a:endParaRPr lang="en-CA" dirty="0"/>
           </a:p>
@@ -2567,7 +2567,7 @@
           <a:lstStyle/>
           <a:p>
             <a:r>
-              <a:rPr lang="en-US" smtClean="0"/>
+              <a:rPr lang="en-US"/>
               <a:t>Click to edit Master title style</a:t>
             </a:r>
             <a:endParaRPr lang="en-CA"/>
@@ -2592,7 +2592,7 @@
             <a:fld id="{5B8DBE04-A610-4052-99FA-194876B9844B}" type="datetimeFigureOut">
               <a:rPr lang="en-CA" smtClean="0"/>
               <a:pPr/>
-              <a:t>2019-11-19</a:t>
+              <a:t>2022-12-01</a:t>
             </a:fld>
             <a:endParaRPr lang="en-CA" dirty="0"/>
           </a:p>
@@ -2684,7 +2684,7 @@
             <a:fld id="{5B8DBE04-A610-4052-99FA-194876B9844B}" type="datetimeFigureOut">
               <a:rPr lang="en-CA" smtClean="0"/>
               <a:pPr/>
-              <a:t>2019-11-19</a:t>
+              <a:t>2022-12-01</a:t>
             </a:fld>
             <a:endParaRPr lang="en-CA" dirty="0"/>
           </a:p>
@@ -2783,7 +2783,7 @@
           </a:lstStyle>
           <a:p>
             <a:r>
-              <a:rPr lang="en-US" smtClean="0"/>
+              <a:rPr lang="en-US"/>
               <a:t>Click to edit Master title style</a:t>
             </a:r>
             <a:endParaRPr lang="en-CA"/>
@@ -2840,35 +2840,35 @@
           <a:p>
             <a:pPr lvl="0"/>
             <a:r>
-              <a:rPr lang="en-US" smtClean="0"/>
+              <a:rPr lang="en-US"/>
               <a:t>Click to edit Master text styles</a:t>
             </a:r>
           </a:p>
           <a:p>
             <a:pPr lvl="1"/>
             <a:r>
-              <a:rPr lang="en-US" smtClean="0"/>
+              <a:rPr lang="en-US"/>
               <a:t>Second level</a:t>
             </a:r>
           </a:p>
           <a:p>
             <a:pPr lvl="2"/>
             <a:r>
-              <a:rPr lang="en-US" smtClean="0"/>
+              <a:rPr lang="en-US"/>
               <a:t>Third level</a:t>
             </a:r>
           </a:p>
           <a:p>
             <a:pPr lvl="3"/>
             <a:r>
-              <a:rPr lang="en-US" smtClean="0"/>
+              <a:rPr lang="en-US"/>
               <a:t>Fourth level</a:t>
             </a:r>
           </a:p>
           <a:p>
             <a:pPr lvl="4"/>
             <a:r>
-              <a:rPr lang="en-US" smtClean="0"/>
+              <a:rPr lang="en-US"/>
               <a:t>Fifth level</a:t>
             </a:r>
             <a:endParaRPr lang="en-CA"/>
@@ -2934,7 +2934,7 @@
           <a:p>
             <a:pPr lvl="0"/>
             <a:r>
-              <a:rPr lang="en-US" smtClean="0"/>
+              <a:rPr lang="en-US"/>
               <a:t>Click to edit Master text styles</a:t>
             </a:r>
           </a:p>
@@ -2958,7 +2958,7 @@
             <a:fld id="{5B8DBE04-A610-4052-99FA-194876B9844B}" type="datetimeFigureOut">
               <a:rPr lang="en-CA" smtClean="0"/>
               <a:pPr/>
-              <a:t>2019-11-19</a:t>
+              <a:t>2022-12-01</a:t>
             </a:fld>
             <a:endParaRPr lang="en-CA" dirty="0"/>
           </a:p>
@@ -3057,7 +3057,7 @@
           </a:lstStyle>
           <a:p>
             <a:r>
-              <a:rPr lang="en-US" smtClean="0"/>
+              <a:rPr lang="en-US"/>
               <a:t>Click to edit Master title style</a:t>
             </a:r>
             <a:endParaRPr lang="en-CA"/>
@@ -3184,7 +3184,7 @@
           <a:p>
             <a:pPr lvl="0"/>
             <a:r>
-              <a:rPr lang="en-US" smtClean="0"/>
+              <a:rPr lang="en-US"/>
               <a:t>Click to edit Master text styles</a:t>
             </a:r>
           </a:p>
@@ -3208,7 +3208,7 @@
             <a:fld id="{5B8DBE04-A610-4052-99FA-194876B9844B}" type="datetimeFigureOut">
               <a:rPr lang="en-CA" smtClean="0"/>
               <a:pPr/>
-              <a:t>2019-11-19</a:t>
+              <a:t>2022-12-01</a:t>
             </a:fld>
             <a:endParaRPr lang="en-CA" dirty="0"/>
           </a:p>
@@ -3316,7 +3316,7 @@
           <a:lstStyle/>
           <a:p>
             <a:r>
-              <a:rPr lang="en-US" smtClean="0"/>
+              <a:rPr lang="en-US"/>
               <a:t>Click to edit Master title style</a:t>
             </a:r>
             <a:endParaRPr lang="en-CA"/>
@@ -3350,35 +3350,35 @@
           <a:p>
             <a:pPr lvl="0"/>
             <a:r>
-              <a:rPr lang="en-US" dirty="0" smtClean="0"/>
+              <a:rPr lang="en-US" dirty="0"/>
               <a:t>Click to edit Master text styles</a:t>
             </a:r>
           </a:p>
           <a:p>
             <a:pPr lvl="1"/>
             <a:r>
-              <a:rPr lang="en-US" dirty="0" smtClean="0"/>
+              <a:rPr lang="en-US" dirty="0"/>
               <a:t>Second level</a:t>
             </a:r>
           </a:p>
           <a:p>
             <a:pPr lvl="2"/>
             <a:r>
-              <a:rPr lang="en-US" dirty="0" smtClean="0"/>
+              <a:rPr lang="en-US" dirty="0"/>
               <a:t>Third level</a:t>
             </a:r>
           </a:p>
           <a:p>
             <a:pPr lvl="3"/>
             <a:r>
-              <a:rPr lang="en-US" dirty="0" smtClean="0"/>
+              <a:rPr lang="en-US" dirty="0"/>
               <a:t>Fourth level</a:t>
             </a:r>
           </a:p>
           <a:p>
             <a:pPr lvl="4"/>
             <a:r>
-              <a:rPr lang="en-US" dirty="0" smtClean="0"/>
+              <a:rPr lang="en-US" dirty="0"/>
               <a:t>Fifth level</a:t>
             </a:r>
             <a:endParaRPr lang="en-CA" dirty="0"/>
@@ -3419,7 +3419,7 @@
             <a:fld id="{5B8DBE04-A610-4052-99FA-194876B9844B}" type="datetimeFigureOut">
               <a:rPr lang="en-CA" smtClean="0"/>
               <a:pPr/>
-              <a:t>2019-11-19</a:t>
+              <a:t>2022-12-01</a:t>
             </a:fld>
             <a:endParaRPr lang="en-CA" dirty="0"/>
           </a:p>
@@ -3527,7 +3527,7 @@
               <a:buChar char="•"/>
             </a:pPr>
             <a:r>
-              <a:rPr lang="en-CA" sz="1050" baseline="0" dirty="0" smtClean="0">
+              <a:rPr lang="en-CA" sz="1050" baseline="0" dirty="0">
                 <a:solidFill>
                   <a:schemeClr val="bg1"/>
                 </a:solidFill>
@@ -3844,7 +3844,7 @@
           <a:lstStyle/>
           <a:p>
             <a:r>
-              <a:rPr lang="en-CA" dirty="0" err="1" smtClean="0"/>
+              <a:rPr lang="en-CA" dirty="0" err="1"/>
               <a:t>Lua</a:t>
             </a:r>
             <a:endParaRPr lang="en-CA" dirty="0"/>
@@ -3867,16 +3867,15 @@
           <a:lstStyle/>
           <a:p>
             <a:r>
-              <a:rPr lang="en-CA" dirty="0" smtClean="0"/>
+              <a:rPr lang="en-CA" dirty="0"/>
               <a:t>Language</a:t>
             </a:r>
           </a:p>
           <a:p>
             <a:r>
-              <a:rPr lang="en-CA" dirty="0" smtClean="0"/>
+              <a:rPr lang="en-CA" dirty="0"/>
               <a:t>Integration (C, and some suggestions)</a:t>
             </a:r>
-            <a:endParaRPr lang="en-CA" dirty="0"/>
           </a:p>
         </p:txBody>
       </p:sp>
@@ -3928,14 +3927,13 @@
           <a:lstStyle/>
           <a:p>
             <a:r>
-              <a:rPr lang="en-CA" dirty="0" err="1" smtClean="0"/>
+              <a:rPr lang="en-CA" dirty="0" err="1"/>
               <a:t>Lua</a:t>
             </a:r>
             <a:r>
-              <a:rPr lang="en-CA" dirty="0" smtClean="0"/>
+              <a:rPr lang="en-CA" dirty="0"/>
               <a:t> tables</a:t>
             </a:r>
-            <a:endParaRPr lang="en-CA" dirty="0"/>
           </a:p>
         </p:txBody>
       </p:sp>
@@ -3962,35 +3960,35 @@
           <a:lstStyle/>
           <a:p>
             <a:r>
-              <a:rPr lang="en-US" dirty="0" smtClean="0"/>
+              <a:rPr lang="en-US" dirty="0"/>
               <a:t>Tables are a separate, hidden things, that are </a:t>
             </a:r>
             <a:r>
-              <a:rPr lang="en-US" i="1" dirty="0" smtClean="0"/>
+              <a:rPr lang="en-US" i="1" dirty="0"/>
               <a:t>referenced </a:t>
             </a:r>
             <a:r>
-              <a:rPr lang="en-US" dirty="0" smtClean="0"/>
+              <a:rPr lang="en-US" dirty="0"/>
               <a:t>by other variables</a:t>
             </a:r>
           </a:p>
           <a:p>
             <a:r>
-              <a:rPr lang="en-US" dirty="0" smtClean="0"/>
+              <a:rPr lang="en-US" dirty="0"/>
               <a:t>a = {}        // creates a table and “points” to it</a:t>
             </a:r>
           </a:p>
           <a:p>
             <a:r>
-              <a:rPr lang="en-US" dirty="0" smtClean="0"/>
+              <a:rPr lang="en-US" dirty="0"/>
               <a:t>So “a” </a:t>
             </a:r>
             <a:r>
-              <a:rPr lang="en-US" i="1" dirty="0" smtClean="0"/>
+              <a:rPr lang="en-US" i="1" dirty="0"/>
               <a:t>isn’t </a:t>
             </a:r>
             <a:r>
-              <a:rPr lang="en-US" dirty="0" smtClean="0"/>
+              <a:rPr lang="en-US" dirty="0"/>
               <a:t>a table, it only refers to it</a:t>
             </a:r>
           </a:p>
@@ -3998,7 +3996,7 @@
             <a:pPr>
               <a:buNone/>
             </a:pPr>
-            <a:endParaRPr lang="en-CA" dirty="0" smtClean="0"/>
+            <a:endParaRPr lang="en-CA" dirty="0"/>
           </a:p>
           <a:p>
             <a:endParaRPr lang="en-CA" dirty="0"/>
@@ -4079,28 +4077,28 @@
           <a:p>
             <a:pPr algn="ctr"/>
             <a:r>
-              <a:rPr lang="en-US" dirty="0" smtClean="0"/>
+              <a:rPr lang="en-US" dirty="0"/>
               <a:t>a = {}</a:t>
             </a:r>
           </a:p>
           <a:p>
             <a:pPr algn="ctr"/>
             <a:r>
-              <a:rPr lang="en-US" dirty="0" smtClean="0"/>
+              <a:rPr lang="en-US" dirty="0"/>
               <a:t>K = a</a:t>
             </a:r>
           </a:p>
           <a:p>
             <a:pPr algn="ctr"/>
             <a:r>
-              <a:rPr lang="en-US" dirty="0" smtClean="0"/>
+              <a:rPr lang="en-US" dirty="0"/>
               <a:t>a = nil</a:t>
             </a:r>
           </a:p>
           <a:p>
             <a:pPr algn="ctr"/>
             <a:r>
-              <a:rPr lang="en-US" dirty="0" smtClean="0"/>
+              <a:rPr lang="en-US" dirty="0"/>
               <a:t>K = nil</a:t>
             </a:r>
             <a:endParaRPr lang="en-CA" dirty="0"/>
@@ -4144,7 +4142,7 @@
           <a:p>
             <a:pPr algn="ctr"/>
             <a:r>
-              <a:rPr lang="en-US" dirty="0" smtClean="0"/>
+              <a:rPr lang="en-US" dirty="0"/>
               <a:t>Table is still there</a:t>
             </a:r>
             <a:endParaRPr lang="en-CA" dirty="0"/>
@@ -4188,7 +4186,7 @@
           <a:p>
             <a:pPr algn="ctr"/>
             <a:r>
-              <a:rPr lang="en-US" dirty="0" smtClean="0"/>
+              <a:rPr lang="en-US" dirty="0"/>
               <a:t>NOW the table can be garbage collected </a:t>
             </a:r>
             <a:endParaRPr lang="en-CA" dirty="0"/>
@@ -4513,14 +4511,13 @@
           <a:lstStyle/>
           <a:p>
             <a:r>
-              <a:rPr lang="en-CA" dirty="0" err="1" smtClean="0"/>
+              <a:rPr lang="en-CA" dirty="0" err="1"/>
               <a:t>Lua</a:t>
             </a:r>
             <a:r>
-              <a:rPr lang="en-CA" dirty="0" smtClean="0"/>
+              <a:rPr lang="en-CA" dirty="0"/>
               <a:t> tables and the stack, C-API</a:t>
             </a:r>
-            <a:endParaRPr lang="en-CA" dirty="0"/>
           </a:p>
         </p:txBody>
       </p:sp>
@@ -4547,71 +4544,71 @@
           <a:lstStyle/>
           <a:p>
             <a:r>
-              <a:rPr lang="en-US" dirty="0" smtClean="0"/>
+              <a:rPr lang="en-US" dirty="0"/>
               <a:t>Remember that all information being passed back and forth from C and </a:t>
             </a:r>
             <a:r>
-              <a:rPr lang="en-US" dirty="0" err="1" smtClean="0"/>
+              <a:rPr lang="en-US" dirty="0" err="1"/>
               <a:t>Lua</a:t>
             </a:r>
             <a:r>
-              <a:rPr lang="en-US" dirty="0" smtClean="0"/>
+              <a:rPr lang="en-US" dirty="0"/>
               <a:t> is on the “stack”</a:t>
             </a:r>
           </a:p>
           <a:p>
             <a:r>
-              <a:rPr lang="en-US" dirty="0" smtClean="0"/>
+              <a:rPr lang="en-US" dirty="0"/>
               <a:t>So many of these calls </a:t>
             </a:r>
             <a:r>
-              <a:rPr lang="en-US" i="1" dirty="0" smtClean="0"/>
+              <a:rPr lang="en-US" i="1" dirty="0"/>
               <a:t>indirectly </a:t>
             </a:r>
             <a:r>
-              <a:rPr lang="en-US" dirty="0" smtClean="0"/>
+              <a:rPr lang="en-US" dirty="0"/>
               <a:t>refer to the stack</a:t>
             </a:r>
           </a:p>
           <a:p>
             <a:pPr lvl="1"/>
             <a:r>
-              <a:rPr lang="en-US" dirty="0" smtClean="0"/>
+              <a:rPr lang="en-US" dirty="0"/>
               <a:t>(that’s one of the usual things to get used to)</a:t>
             </a:r>
           </a:p>
           <a:p>
             <a:r>
-              <a:rPr lang="en-CA" dirty="0" err="1" smtClean="0"/>
+              <a:rPr lang="en-CA" dirty="0" err="1"/>
               <a:t>lua_istable</a:t>
             </a:r>
             <a:r>
-              <a:rPr lang="en-CA" dirty="0" smtClean="0"/>
+              <a:rPr lang="en-CA" dirty="0"/>
               <a:t>( L, -1 )	</a:t>
             </a:r>
             <a:r>
-              <a:rPr lang="en-CA" sz="2800" i="1" dirty="0" smtClean="0">
+              <a:rPr lang="en-CA" sz="2800" i="1" dirty="0">
                 <a:latin typeface="Times New Roman" pitchFamily="18" charset="0"/>
                 <a:cs typeface="Times New Roman" pitchFamily="18" charset="0"/>
               </a:rPr>
               <a:t>is thing at stack top a table?</a:t>
             </a:r>
-            <a:endParaRPr lang="en-CA" i="1" dirty="0" smtClean="0">
+            <a:endParaRPr lang="en-CA" i="1" dirty="0">
               <a:latin typeface="Times New Roman" pitchFamily="18" charset="0"/>
               <a:cs typeface="Times New Roman" pitchFamily="18" charset="0"/>
             </a:endParaRPr>
           </a:p>
           <a:p>
             <a:r>
-              <a:rPr lang="en-US" dirty="0" err="1" smtClean="0"/>
+              <a:rPr lang="en-US" dirty="0" err="1"/>
               <a:t>lua_newtable</a:t>
             </a:r>
             <a:r>
-              <a:rPr lang="en-US" dirty="0" smtClean="0"/>
+              <a:rPr lang="en-US" dirty="0"/>
               <a:t>(L)      </a:t>
             </a:r>
             <a:r>
-              <a:rPr lang="en-US" sz="2800" i="1" dirty="0" smtClean="0">
+              <a:rPr lang="en-US" sz="2800" i="1" dirty="0">
                 <a:latin typeface="Times New Roman" pitchFamily="18" charset="0"/>
                 <a:cs typeface="Times New Roman" pitchFamily="18" charset="0"/>
               </a:rPr>
@@ -4622,7 +4619,7 @@
             <a:pPr>
               <a:buNone/>
             </a:pPr>
-            <a:endParaRPr lang="en-CA" dirty="0" smtClean="0"/>
+            <a:endParaRPr lang="en-CA" dirty="0"/>
           </a:p>
           <a:p>
             <a:endParaRPr lang="en-CA" dirty="0"/>
@@ -5088,14 +5085,13 @@
           <a:lstStyle/>
           <a:p>
             <a:r>
-              <a:rPr lang="en-CA" dirty="0" err="1" smtClean="0"/>
+              <a:rPr lang="en-CA" dirty="0" err="1"/>
               <a:t>Lua</a:t>
             </a:r>
             <a:r>
-              <a:rPr lang="en-CA" dirty="0" smtClean="0"/>
+              <a:rPr lang="en-CA" dirty="0"/>
               <a:t> tables and the stack, C-API</a:t>
             </a:r>
-            <a:endParaRPr lang="en-CA" dirty="0"/>
           </a:p>
         </p:txBody>
       </p:sp>
@@ -5122,35 +5118,35 @@
           <a:lstStyle/>
           <a:p>
             <a:r>
-              <a:rPr lang="en-US" dirty="0" smtClean="0"/>
+              <a:rPr lang="en-US" dirty="0"/>
               <a:t>Most of these “table” functions manipulate “current” location in the stack (for things like </a:t>
             </a:r>
             <a:r>
-              <a:rPr lang="en-US" dirty="0" err="1" smtClean="0"/>
+              <a:rPr lang="en-US" dirty="0" err="1"/>
               <a:t>lua_pushnumber</a:t>
             </a:r>
             <a:r>
-              <a:rPr lang="en-US" dirty="0" smtClean="0"/>
+              <a:rPr lang="en-US" dirty="0"/>
               <a:t>, etc.)</a:t>
             </a:r>
           </a:p>
           <a:p>
             <a:r>
-              <a:rPr lang="en-US" dirty="0" err="1" smtClean="0"/>
+              <a:rPr lang="en-US" dirty="0" err="1"/>
               <a:t>lua_gettable</a:t>
             </a:r>
             <a:r>
-              <a:rPr lang="en-US" dirty="0" smtClean="0"/>
+              <a:rPr lang="en-US" dirty="0"/>
               <a:t>( L, x )   points to top of stack</a:t>
             </a:r>
           </a:p>
           <a:p>
             <a:r>
-              <a:rPr lang="en-US" dirty="0" err="1" smtClean="0"/>
+              <a:rPr lang="en-US" dirty="0" err="1"/>
               <a:t>lua_settable</a:t>
             </a:r>
             <a:r>
-              <a:rPr lang="en-US" dirty="0" smtClean="0"/>
+              <a:rPr lang="en-US" dirty="0"/>
               <a:t>( L, x )   Takes the two items “above” x in the stack (index and value), places them into a table (along with an entry) and pops them off the stack (i.e. eliminating them) </a:t>
             </a:r>
           </a:p>
@@ -5158,7 +5154,7 @@
             <a:pPr>
               <a:buNone/>
             </a:pPr>
-            <a:endParaRPr lang="en-CA" dirty="0" smtClean="0"/>
+            <a:endParaRPr lang="en-CA" dirty="0"/>
           </a:p>
           <a:p>
             <a:endParaRPr lang="en-CA" dirty="0"/>
@@ -5520,14 +5516,13 @@
           <a:lstStyle/>
           <a:p>
             <a:r>
-              <a:rPr lang="en-CA" dirty="0" err="1" smtClean="0"/>
+              <a:rPr lang="en-CA" dirty="0" err="1"/>
               <a:t>Lua</a:t>
             </a:r>
             <a:r>
-              <a:rPr lang="en-CA" dirty="0" smtClean="0"/>
+              <a:rPr lang="en-CA" dirty="0"/>
               <a:t> tables and the stack, C-API</a:t>
             </a:r>
-            <a:endParaRPr lang="en-CA" dirty="0"/>
           </a:p>
         </p:txBody>
       </p:sp>
@@ -5554,44 +5549,44 @@
           <a:lstStyle/>
           <a:p>
             <a:r>
-              <a:rPr lang="en-US" dirty="0" smtClean="0"/>
+              <a:rPr lang="en-US" dirty="0"/>
               <a:t>Note many functions call “</a:t>
             </a:r>
             <a:r>
-              <a:rPr lang="en-US" dirty="0" err="1" smtClean="0"/>
+              <a:rPr lang="en-US" dirty="0" err="1"/>
               <a:t>metamethods</a:t>
             </a:r>
             <a:r>
-              <a:rPr lang="en-US" dirty="0" smtClean="0"/>
+              <a:rPr lang="en-US" dirty="0"/>
               <a:t>” that manipulate the stack. </a:t>
             </a:r>
           </a:p>
           <a:p>
             <a:pPr lvl="1"/>
             <a:r>
-              <a:rPr lang="en-US" dirty="0" smtClean="0"/>
+              <a:rPr lang="en-US" dirty="0"/>
               <a:t>For example </a:t>
             </a:r>
             <a:r>
-              <a:rPr lang="en-US" dirty="0" err="1" smtClean="0"/>
+              <a:rPr lang="en-US" dirty="0" err="1"/>
               <a:t>lua_settable</a:t>
             </a:r>
             <a:r>
-              <a:rPr lang="en-US" dirty="0" smtClean="0"/>
+              <a:rPr lang="en-US" dirty="0"/>
               <a:t>, which “pops” (removes) two items (name, value) from the stack, then saves them into a new table, will alter the indices of the stack. </a:t>
             </a:r>
           </a:p>
           <a:p>
             <a:pPr lvl="1"/>
             <a:r>
-              <a:rPr lang="en-US" dirty="0" smtClean="0"/>
+              <a:rPr lang="en-US" dirty="0"/>
               <a:t>If you are pointing to the “top” of the stack, this is easily manageable, but is still somewhat annoying</a:t>
             </a:r>
           </a:p>
           <a:p>
             <a:pPr lvl="1"/>
             <a:r>
-              <a:rPr lang="en-US" dirty="0" smtClean="0"/>
+              <a:rPr lang="en-US" dirty="0"/>
               <a:t>They are also verbose and “slow”</a:t>
             </a:r>
           </a:p>
@@ -5599,7 +5594,7 @@
             <a:pPr>
               <a:buNone/>
             </a:pPr>
-            <a:endParaRPr lang="en-CA" dirty="0" smtClean="0"/>
+            <a:endParaRPr lang="en-CA" dirty="0"/>
           </a:p>
           <a:p>
             <a:endParaRPr lang="en-CA" dirty="0"/>
@@ -5968,15 +5963,15 @@
           <a:lstStyle/>
           <a:p>
             <a:r>
-              <a:rPr lang="en-US" dirty="0" err="1" smtClean="0"/>
+              <a:rPr lang="en-US" dirty="0" err="1"/>
               <a:t>lua_rawseti</a:t>
             </a:r>
             <a:r>
-              <a:rPr lang="en-US" dirty="0" smtClean="0"/>
+              <a:rPr lang="en-US" dirty="0"/>
               <a:t>, </a:t>
             </a:r>
             <a:r>
-              <a:rPr lang="en-US" dirty="0" err="1" smtClean="0"/>
+              <a:rPr lang="en-US" dirty="0" err="1"/>
               <a:t>lua_rawgeti</a:t>
             </a:r>
             <a:endParaRPr lang="en-CA" dirty="0"/>
@@ -6006,45 +6001,45 @@
           <a:lstStyle/>
           <a:p>
             <a:r>
-              <a:rPr lang="en-US" dirty="0" smtClean="0"/>
+              <a:rPr lang="en-US" dirty="0"/>
               <a:t>Since you are often doing a number of table operations at the same time…</a:t>
             </a:r>
           </a:p>
           <a:p>
             <a:pPr lvl="1"/>
             <a:r>
-              <a:rPr lang="en-US" dirty="0" err="1" smtClean="0"/>
+              <a:rPr lang="en-US" dirty="0" err="1"/>
               <a:t>lua_gettable</a:t>
             </a:r>
             <a:r>
-              <a:rPr lang="en-US" dirty="0" smtClean="0"/>
+              <a:rPr lang="en-US" dirty="0"/>
               <a:t>( L, -1 )		</a:t>
             </a:r>
             <a:r>
-              <a:rPr lang="en-CA" i="1" dirty="0" smtClean="0">
+              <a:rPr lang="en-CA" i="1" dirty="0">
                 <a:latin typeface="Times New Roman" pitchFamily="18" charset="0"/>
                 <a:cs typeface="Times New Roman" pitchFamily="18" charset="0"/>
               </a:rPr>
               <a:t> Get table at stack top</a:t>
             </a:r>
-            <a:endParaRPr lang="en-US" dirty="0" smtClean="0"/>
+            <a:endParaRPr lang="en-US" dirty="0"/>
           </a:p>
           <a:p>
             <a:pPr lvl="1"/>
             <a:r>
-              <a:rPr lang="en-US" dirty="0" smtClean="0"/>
+              <a:rPr lang="en-US" dirty="0"/>
               <a:t>x = </a:t>
             </a:r>
             <a:r>
-              <a:rPr lang="en-US" dirty="0" err="1" smtClean="0"/>
+              <a:rPr lang="en-US" dirty="0" err="1"/>
               <a:t>lua_tonumber</a:t>
             </a:r>
             <a:r>
-              <a:rPr lang="en-US" dirty="0" smtClean="0"/>
+              <a:rPr lang="en-US" dirty="0"/>
               <a:t>( L, -1)	</a:t>
             </a:r>
             <a:r>
-              <a:rPr lang="en-CA" i="1" dirty="0" smtClean="0">
+              <a:rPr lang="en-CA" i="1" dirty="0">
                 <a:latin typeface="Times New Roman" pitchFamily="18" charset="0"/>
                 <a:cs typeface="Times New Roman" pitchFamily="18" charset="0"/>
               </a:rPr>
@@ -6053,7 +6048,7 @@
           </a:p>
           <a:p>
             <a:r>
-              <a:rPr lang="en-US" dirty="0" smtClean="0"/>
+              <a:rPr lang="en-US" dirty="0"/>
               <a:t>…there are “raw” functions that do this at the same time (and are faster, too)</a:t>
             </a:r>
           </a:p>
@@ -6061,7 +6056,7 @@
             <a:pPr>
               <a:buNone/>
             </a:pPr>
-            <a:endParaRPr lang="en-CA" dirty="0" smtClean="0"/>
+            <a:endParaRPr lang="en-CA" dirty="0"/>
           </a:p>
           <a:p>
             <a:endParaRPr lang="en-CA" dirty="0"/>
@@ -6443,14 +6438,13 @@
           <a:lstStyle/>
           <a:p>
             <a:r>
-              <a:rPr lang="en-CA" dirty="0" err="1" smtClean="0"/>
+              <a:rPr lang="en-CA" dirty="0" err="1"/>
               <a:t>Lua</a:t>
             </a:r>
             <a:r>
-              <a:rPr lang="en-CA" dirty="0" smtClean="0"/>
+              <a:rPr lang="en-CA" dirty="0"/>
               <a:t> “registry”</a:t>
             </a:r>
-            <a:endParaRPr lang="en-CA" dirty="0"/>
           </a:p>
         </p:txBody>
       </p:sp>
@@ -6472,19 +6466,19 @@
           <a:lstStyle/>
           <a:p>
             <a:r>
-              <a:rPr lang="en-US" dirty="0" smtClean="0"/>
+              <a:rPr lang="en-US" dirty="0"/>
               <a:t>Used for persistent information between function calls, for C. </a:t>
             </a:r>
-            <a:endParaRPr lang="en-CA" dirty="0" smtClean="0"/>
-          </a:p>
-          <a:p>
-            <a:r>
-              <a:rPr lang="en-CA" dirty="0" smtClean="0"/>
+            <a:endParaRPr lang="en-CA" dirty="0"/>
+          </a:p>
+          <a:p>
+            <a:r>
+              <a:rPr lang="en-CA" dirty="0"/>
               <a:t>Acts like the stack, but isn’t in the stack.</a:t>
             </a:r>
           </a:p>
           <a:p>
-            <a:endParaRPr lang="en-CA" dirty="0" smtClean="0"/>
+            <a:endParaRPr lang="en-CA" dirty="0"/>
           </a:p>
           <a:p>
             <a:endParaRPr lang="en-CA" dirty="0"/>
@@ -6785,14 +6779,13 @@
           <a:lstStyle/>
           <a:p>
             <a:r>
-              <a:rPr lang="en-CA" dirty="0" err="1" smtClean="0"/>
+              <a:rPr lang="en-CA" dirty="0" err="1"/>
               <a:t>Lua</a:t>
             </a:r>
             <a:r>
-              <a:rPr lang="en-CA" dirty="0" smtClean="0"/>
+              <a:rPr lang="en-CA" dirty="0"/>
               <a:t> “registry”</a:t>
             </a:r>
-            <a:endParaRPr lang="en-CA" dirty="0"/>
           </a:p>
         </p:txBody>
       </p:sp>
@@ -6819,154 +6812,154 @@
           <a:lstStyle/>
           <a:p>
             <a:r>
-              <a:rPr lang="en-US" dirty="0" smtClean="0"/>
+              <a:rPr lang="en-US" dirty="0"/>
               <a:t> /* variable with an unique address */</a:t>
             </a:r>
           </a:p>
           <a:p>
             <a:r>
-              <a:rPr lang="en-US" dirty="0" smtClean="0"/>
+              <a:rPr lang="en-US" dirty="0"/>
               <a:t>    static const char Key = 'k';</a:t>
             </a:r>
           </a:p>
           <a:p>
             <a:r>
-              <a:rPr lang="en-US" dirty="0" smtClean="0"/>
+              <a:rPr lang="en-US" dirty="0"/>
               <a:t>    </a:t>
             </a:r>
           </a:p>
           <a:p>
             <a:r>
-              <a:rPr lang="en-US" dirty="0" smtClean="0"/>
+              <a:rPr lang="en-US" dirty="0"/>
               <a:t>    /* store a number */</a:t>
             </a:r>
           </a:p>
           <a:p>
             <a:r>
-              <a:rPr lang="en-US" dirty="0" smtClean="0"/>
+              <a:rPr lang="en-US" dirty="0"/>
               <a:t>    </a:t>
             </a:r>
             <a:r>
-              <a:rPr lang="en-US" dirty="0" err="1" smtClean="0"/>
+              <a:rPr lang="en-US" dirty="0" err="1"/>
               <a:t>lua_pushlightuserdata</a:t>
             </a:r>
             <a:r>
-              <a:rPr lang="en-US" dirty="0" smtClean="0"/>
+              <a:rPr lang="en-US" dirty="0"/>
               <a:t>(L, (void *)&amp;Key);  /* push address */</a:t>
             </a:r>
           </a:p>
           <a:p>
             <a:r>
-              <a:rPr lang="en-US" dirty="0" smtClean="0"/>
+              <a:rPr lang="en-US" dirty="0"/>
               <a:t>    </a:t>
             </a:r>
             <a:r>
-              <a:rPr lang="en-US" dirty="0" err="1" smtClean="0"/>
+              <a:rPr lang="en-US" dirty="0" err="1"/>
               <a:t>lua_pushnumber</a:t>
             </a:r>
             <a:r>
-              <a:rPr lang="en-US" dirty="0" smtClean="0"/>
+              <a:rPr lang="en-US" dirty="0"/>
               <a:t>(L, </a:t>
             </a:r>
             <a:r>
-              <a:rPr lang="en-US" dirty="0" err="1" smtClean="0"/>
+              <a:rPr lang="en-US" dirty="0" err="1"/>
               <a:t>myNumber</a:t>
             </a:r>
             <a:r>
-              <a:rPr lang="en-US" dirty="0" smtClean="0"/>
+              <a:rPr lang="en-US" dirty="0"/>
               <a:t>);  /* push value */</a:t>
             </a:r>
           </a:p>
           <a:p>
             <a:r>
-              <a:rPr lang="en-US" dirty="0" smtClean="0"/>
+              <a:rPr lang="en-US" dirty="0"/>
               <a:t>    /* registry[&amp;Key] = </a:t>
             </a:r>
             <a:r>
-              <a:rPr lang="en-US" dirty="0" err="1" smtClean="0"/>
+              <a:rPr lang="en-US" dirty="0" err="1"/>
               <a:t>myNumber</a:t>
             </a:r>
             <a:r>
-              <a:rPr lang="en-US" dirty="0" smtClean="0"/>
+              <a:rPr lang="en-US" dirty="0"/>
               <a:t> */</a:t>
             </a:r>
           </a:p>
           <a:p>
             <a:r>
-              <a:rPr lang="en-US" dirty="0" smtClean="0"/>
+              <a:rPr lang="en-US" dirty="0"/>
               <a:t>    </a:t>
             </a:r>
             <a:r>
-              <a:rPr lang="en-US" dirty="0" err="1" smtClean="0"/>
+              <a:rPr lang="en-US" dirty="0" err="1"/>
               <a:t>lua_settable</a:t>
             </a:r>
             <a:r>
-              <a:rPr lang="en-US" dirty="0" smtClean="0"/>
+              <a:rPr lang="en-US" dirty="0"/>
               <a:t>(L, LUA_REGISTRYINDEX);</a:t>
             </a:r>
           </a:p>
           <a:p>
             <a:r>
-              <a:rPr lang="en-US" dirty="0" smtClean="0"/>
+              <a:rPr lang="en-US" dirty="0"/>
               <a:t>    </a:t>
             </a:r>
           </a:p>
           <a:p>
             <a:r>
-              <a:rPr lang="en-US" dirty="0" smtClean="0"/>
+              <a:rPr lang="en-US" dirty="0"/>
               <a:t>    /* retrieve a number */</a:t>
             </a:r>
           </a:p>
           <a:p>
             <a:r>
-              <a:rPr lang="en-US" dirty="0" smtClean="0"/>
+              <a:rPr lang="en-US" dirty="0"/>
               <a:t>    </a:t>
             </a:r>
             <a:r>
-              <a:rPr lang="en-US" dirty="0" err="1" smtClean="0"/>
+              <a:rPr lang="en-US" dirty="0" err="1"/>
               <a:t>lua_pushlightuserdata</a:t>
             </a:r>
             <a:r>
-              <a:rPr lang="en-US" dirty="0" smtClean="0"/>
+              <a:rPr lang="en-US" dirty="0"/>
               <a:t>(L, (void *)&amp;Key);  /* push address */</a:t>
             </a:r>
           </a:p>
           <a:p>
             <a:r>
-              <a:rPr lang="en-US" dirty="0" smtClean="0"/>
+              <a:rPr lang="en-US" dirty="0"/>
               <a:t>    </a:t>
             </a:r>
             <a:r>
-              <a:rPr lang="en-US" dirty="0" err="1" smtClean="0"/>
+              <a:rPr lang="en-US" dirty="0" err="1"/>
               <a:t>lua_gettable</a:t>
             </a:r>
             <a:r>
-              <a:rPr lang="en-US" dirty="0" smtClean="0"/>
+              <a:rPr lang="en-US" dirty="0"/>
               <a:t>(L, LUA_REGISTRYINDEX);  /* retrieve value */</a:t>
             </a:r>
           </a:p>
           <a:p>
             <a:r>
-              <a:rPr lang="en-US" dirty="0" smtClean="0"/>
+              <a:rPr lang="en-US" dirty="0"/>
               <a:t>    </a:t>
             </a:r>
             <a:r>
-              <a:rPr lang="en-US" dirty="0" err="1" smtClean="0"/>
+              <a:rPr lang="en-US" dirty="0" err="1"/>
               <a:t>myNumber</a:t>
             </a:r>
             <a:r>
-              <a:rPr lang="en-US" dirty="0" smtClean="0"/>
+              <a:rPr lang="en-US" dirty="0"/>
               <a:t> = </a:t>
             </a:r>
             <a:r>
-              <a:rPr lang="en-US" dirty="0" err="1" smtClean="0"/>
+              <a:rPr lang="en-US" dirty="0" err="1"/>
               <a:t>lua_tonumber</a:t>
             </a:r>
             <a:r>
-              <a:rPr lang="en-US" dirty="0" smtClean="0"/>
+              <a:rPr lang="en-US" dirty="0"/>
               <a:t>(L, -1);  /* convert to number */</a:t>
             </a:r>
-            <a:endParaRPr lang="en-CA" dirty="0" smtClean="0"/>
+            <a:endParaRPr lang="en-CA" dirty="0"/>
           </a:p>
           <a:p>
             <a:endParaRPr lang="en-CA" dirty="0"/>
@@ -7144,14 +7137,13 @@
           <a:lstStyle/>
           <a:p>
             <a:r>
-              <a:rPr lang="en-CA" dirty="0" err="1" smtClean="0"/>
+              <a:rPr lang="en-CA" dirty="0" err="1"/>
               <a:t>Lua</a:t>
             </a:r>
             <a:r>
-              <a:rPr lang="en-CA" dirty="0" smtClean="0"/>
+              <a:rPr lang="en-CA" dirty="0"/>
               <a:t> “registry”</a:t>
             </a:r>
-            <a:endParaRPr lang="en-CA" dirty="0"/>
           </a:p>
         </p:txBody>
       </p:sp>
@@ -7178,154 +7170,154 @@
           <a:lstStyle/>
           <a:p>
             <a:r>
-              <a:rPr lang="en-US" dirty="0" smtClean="0"/>
+              <a:rPr lang="en-US" dirty="0"/>
               <a:t> /* variable with an unique address */</a:t>
             </a:r>
           </a:p>
           <a:p>
             <a:r>
-              <a:rPr lang="en-US" dirty="0" smtClean="0"/>
+              <a:rPr lang="en-US" dirty="0"/>
               <a:t>    static const char Key = 'k';</a:t>
             </a:r>
           </a:p>
           <a:p>
             <a:r>
-              <a:rPr lang="en-US" dirty="0" smtClean="0"/>
+              <a:rPr lang="en-US" dirty="0"/>
               <a:t>    </a:t>
             </a:r>
           </a:p>
           <a:p>
             <a:r>
-              <a:rPr lang="en-US" dirty="0" smtClean="0"/>
+              <a:rPr lang="en-US" dirty="0"/>
               <a:t>    /* store a number */</a:t>
             </a:r>
           </a:p>
           <a:p>
             <a:r>
-              <a:rPr lang="en-US" dirty="0" smtClean="0"/>
+              <a:rPr lang="en-US" dirty="0"/>
               <a:t>    </a:t>
             </a:r>
             <a:r>
-              <a:rPr lang="en-US" dirty="0" err="1" smtClean="0"/>
+              <a:rPr lang="en-US" dirty="0" err="1"/>
               <a:t>lua_pushlightuserdata</a:t>
             </a:r>
             <a:r>
-              <a:rPr lang="en-US" dirty="0" smtClean="0"/>
+              <a:rPr lang="en-US" dirty="0"/>
               <a:t>(L, (void *)&amp;Key);  /* push address */</a:t>
             </a:r>
           </a:p>
           <a:p>
             <a:r>
-              <a:rPr lang="en-US" dirty="0" smtClean="0"/>
+              <a:rPr lang="en-US" dirty="0"/>
               <a:t>    </a:t>
             </a:r>
             <a:r>
-              <a:rPr lang="en-US" dirty="0" err="1" smtClean="0"/>
+              <a:rPr lang="en-US" dirty="0" err="1"/>
               <a:t>lua_pushnumber</a:t>
             </a:r>
             <a:r>
-              <a:rPr lang="en-US" dirty="0" smtClean="0"/>
+              <a:rPr lang="en-US" dirty="0"/>
               <a:t>(L, </a:t>
             </a:r>
             <a:r>
-              <a:rPr lang="en-US" dirty="0" err="1" smtClean="0"/>
+              <a:rPr lang="en-US" dirty="0" err="1"/>
               <a:t>myNumber</a:t>
             </a:r>
             <a:r>
-              <a:rPr lang="en-US" dirty="0" smtClean="0"/>
+              <a:rPr lang="en-US" dirty="0"/>
               <a:t>);  /* push value */</a:t>
             </a:r>
           </a:p>
           <a:p>
             <a:r>
-              <a:rPr lang="en-US" dirty="0" smtClean="0"/>
+              <a:rPr lang="en-US" dirty="0"/>
               <a:t>    /* registry[&amp;Key] = </a:t>
             </a:r>
             <a:r>
-              <a:rPr lang="en-US" dirty="0" err="1" smtClean="0"/>
+              <a:rPr lang="en-US" dirty="0" err="1"/>
               <a:t>myNumber</a:t>
             </a:r>
             <a:r>
-              <a:rPr lang="en-US" dirty="0" smtClean="0"/>
+              <a:rPr lang="en-US" dirty="0"/>
               <a:t> */</a:t>
             </a:r>
           </a:p>
           <a:p>
             <a:r>
-              <a:rPr lang="en-US" dirty="0" smtClean="0"/>
+              <a:rPr lang="en-US" dirty="0"/>
               <a:t>    </a:t>
             </a:r>
             <a:r>
-              <a:rPr lang="en-US" dirty="0" err="1" smtClean="0"/>
+              <a:rPr lang="en-US" dirty="0" err="1"/>
               <a:t>lua_settable</a:t>
             </a:r>
             <a:r>
-              <a:rPr lang="en-US" dirty="0" smtClean="0"/>
+              <a:rPr lang="en-US" dirty="0"/>
               <a:t>(L, LUA_REGISTRYINDEX);</a:t>
             </a:r>
           </a:p>
           <a:p>
             <a:r>
-              <a:rPr lang="en-US" dirty="0" smtClean="0"/>
+              <a:rPr lang="en-US" dirty="0"/>
               <a:t>    </a:t>
             </a:r>
           </a:p>
           <a:p>
             <a:r>
-              <a:rPr lang="en-US" dirty="0" smtClean="0"/>
+              <a:rPr lang="en-US" dirty="0"/>
               <a:t>    /* retrieve a number */</a:t>
             </a:r>
           </a:p>
           <a:p>
             <a:r>
-              <a:rPr lang="en-US" dirty="0" smtClean="0"/>
+              <a:rPr lang="en-US" dirty="0"/>
               <a:t>    </a:t>
             </a:r>
             <a:r>
-              <a:rPr lang="en-US" dirty="0" err="1" smtClean="0"/>
+              <a:rPr lang="en-US" dirty="0" err="1"/>
               <a:t>lua_pushlightuserdata</a:t>
             </a:r>
             <a:r>
-              <a:rPr lang="en-US" dirty="0" smtClean="0"/>
+              <a:rPr lang="en-US" dirty="0"/>
               <a:t>(L, (void *)&amp;Key);  /* push address */</a:t>
             </a:r>
           </a:p>
           <a:p>
             <a:r>
-              <a:rPr lang="en-US" dirty="0" smtClean="0"/>
+              <a:rPr lang="en-US" dirty="0"/>
               <a:t>    </a:t>
             </a:r>
             <a:r>
-              <a:rPr lang="en-US" dirty="0" err="1" smtClean="0"/>
+              <a:rPr lang="en-US" dirty="0" err="1"/>
               <a:t>lua_gettable</a:t>
             </a:r>
             <a:r>
-              <a:rPr lang="en-US" dirty="0" smtClean="0"/>
+              <a:rPr lang="en-US" dirty="0"/>
               <a:t>(L, LUA_REGISTRYINDEX);  /* retrieve value */</a:t>
             </a:r>
           </a:p>
           <a:p>
             <a:r>
-              <a:rPr lang="en-US" dirty="0" smtClean="0"/>
+              <a:rPr lang="en-US" dirty="0"/>
               <a:t>    </a:t>
             </a:r>
             <a:r>
-              <a:rPr lang="en-US" dirty="0" err="1" smtClean="0"/>
+              <a:rPr lang="en-US" dirty="0" err="1"/>
               <a:t>myNumber</a:t>
             </a:r>
             <a:r>
-              <a:rPr lang="en-US" dirty="0" smtClean="0"/>
+              <a:rPr lang="en-US" dirty="0"/>
               <a:t> = </a:t>
             </a:r>
             <a:r>
-              <a:rPr lang="en-US" dirty="0" err="1" smtClean="0"/>
+              <a:rPr lang="en-US" dirty="0" err="1"/>
               <a:t>lua_tonumber</a:t>
             </a:r>
             <a:r>
-              <a:rPr lang="en-US" dirty="0" smtClean="0"/>
+              <a:rPr lang="en-US" dirty="0"/>
               <a:t>(L, -1);  /* convert to number */</a:t>
             </a:r>
-            <a:endParaRPr lang="en-CA" dirty="0" smtClean="0"/>
+            <a:endParaRPr lang="en-CA" dirty="0"/>
           </a:p>
           <a:p>
             <a:endParaRPr lang="en-CA" dirty="0"/>
@@ -7504,37 +7496,37 @@
           <a:p>
             <a:pPr algn="l"/>
             <a:r>
-              <a:rPr lang="en-US" dirty="0" smtClean="0"/>
+              <a:rPr lang="en-US" dirty="0"/>
               <a:t>“Pascal” convention stack (C/C++):</a:t>
             </a:r>
             <a:br>
-              <a:rPr lang="en-US" dirty="0" smtClean="0"/>
+              <a:rPr lang="en-US" dirty="0"/>
             </a:br>
             <a:r>
-              <a:rPr lang="en-US" dirty="0" err="1" smtClean="0"/>
+              <a:rPr lang="en-US" dirty="0" err="1"/>
               <a:t>int</a:t>
             </a:r>
             <a:r>
-              <a:rPr lang="en-US" dirty="0" smtClean="0"/>
+              <a:rPr lang="en-US" dirty="0"/>
               <a:t> p = </a:t>
             </a:r>
             <a:r>
-              <a:rPr lang="en-US" dirty="0" err="1" smtClean="0"/>
+              <a:rPr lang="en-US" dirty="0" err="1"/>
               <a:t>doThis</a:t>
             </a:r>
             <a:r>
-              <a:rPr lang="en-US" dirty="0" smtClean="0"/>
+              <a:rPr lang="en-US" dirty="0"/>
               <a:t>( 6, 2, 5 )</a:t>
             </a:r>
             <a:br>
-              <a:rPr lang="en-US" dirty="0" smtClean="0"/>
+              <a:rPr lang="en-US" dirty="0"/>
             </a:br>
             <a:r>
-              <a:rPr lang="en-US" dirty="0" err="1" smtClean="0"/>
+              <a:rPr lang="en-US" dirty="0" err="1"/>
               <a:t>cout</a:t>
             </a:r>
             <a:r>
-              <a:rPr lang="en-US" dirty="0" smtClean="0"/>
+              <a:rPr lang="en-US" dirty="0"/>
               <a:t> &lt;&lt; p;</a:t>
             </a:r>
             <a:endParaRPr lang="en-CA" dirty="0"/>
@@ -7589,7 +7581,7 @@
         </p:nvSpPr>
         <p:spPr>
           <a:xfrm>
-            <a:off x="685800" y="2628900"/>
+            <a:off x="838200" y="1861332"/>
             <a:ext cx="1981200" cy="800100"/>
           </a:xfrm>
           <a:prstGeom prst="rightArrow">
@@ -7778,7 +7770,7 @@
           <a:p>
             <a:pPr algn="ctr"/>
             <a:r>
-              <a:rPr lang="en-US" sz="2800" dirty="0" smtClean="0"/>
+              <a:rPr lang="en-US" sz="2800" dirty="0"/>
               <a:t>Return address</a:t>
             </a:r>
             <a:endParaRPr lang="en-CA" sz="2800" dirty="0"/>
@@ -7822,7 +7814,7 @@
           <a:p>
             <a:pPr algn="ctr"/>
             <a:r>
-              <a:rPr lang="en-US" sz="3200" dirty="0" smtClean="0"/>
+              <a:rPr lang="en-US" sz="3200" dirty="0"/>
               <a:t>16</a:t>
             </a:r>
             <a:endParaRPr lang="en-CA" sz="3200" dirty="0"/>
@@ -7866,7 +7858,7 @@
           <a:p>
             <a:pPr algn="ctr"/>
             <a:r>
-              <a:rPr lang="en-US" sz="3200" dirty="0" smtClean="0"/>
+              <a:rPr lang="en-US" sz="3200" dirty="0"/>
               <a:t>2</a:t>
             </a:r>
             <a:endParaRPr lang="en-CA" sz="3200" dirty="0"/>
@@ -7910,7 +7902,7 @@
           <a:p>
             <a:pPr algn="ctr"/>
             <a:r>
-              <a:rPr lang="en-US" sz="2800" dirty="0" smtClean="0"/>
+              <a:rPr lang="en-US" sz="2800" dirty="0"/>
               <a:t>6</a:t>
             </a:r>
             <a:endParaRPr lang="en-CA" sz="2800" dirty="0"/>
@@ -7966,102 +7958,86 @@
           <a:p>
             <a:pPr algn="l"/>
             <a:r>
-              <a:rPr lang="en-US" sz="2800" dirty="0" err="1" smtClean="0"/>
+              <a:rPr lang="en-US" sz="2800" dirty="0" err="1"/>
               <a:t>Int</a:t>
             </a:r>
-            <a:r>
-              <a:rPr lang="en-US" sz="2800" dirty="0" smtClean="0"/>
-              <a:t> </a:t>
-            </a:r>
-            <a:r>
-              <a:rPr lang="en-US" sz="2800" dirty="0" err="1" smtClean="0"/>
-              <a:t>doThis</a:t>
-            </a:r>
-            <a:r>
-              <a:rPr lang="en-US" sz="2800" dirty="0" smtClean="0"/>
-              <a:t>(</a:t>
-            </a:r>
-            <a:r>
-              <a:rPr lang="en-US" sz="2800" dirty="0" err="1" smtClean="0"/>
-              <a:t>x,y,z</a:t>
-            </a:r>
-            <a:r>
-              <a:rPr lang="en-US" sz="2800" dirty="0" smtClean="0"/>
-              <a:t>)</a:t>
-            </a:r>
-            <a:br>
-              <a:rPr lang="en-US" sz="2800" dirty="0" smtClean="0"/>
-            </a:br>
-            <a:r>
-              <a:rPr lang="en-US" sz="2800" dirty="0" smtClean="0"/>
-              <a:t>{ </a:t>
-            </a:r>
-            <a:br>
-              <a:rPr lang="en-US" sz="2800" dirty="0" smtClean="0"/>
-            </a:br>
             <a:r>
               <a:rPr lang="en-US" sz="2800" dirty="0"/>
               <a:t> </a:t>
             </a:r>
             <a:r>
-              <a:rPr lang="en-US" sz="2800" dirty="0" smtClean="0"/>
-              <a:t> place(10)</a:t>
-            </a:r>
-            <a:r>
-              <a:rPr lang="en-US" sz="2800" dirty="0" err="1" smtClean="0"/>
+              <a:rPr lang="en-US" sz="2800" dirty="0" err="1"/>
+              <a:t>doThis</a:t>
+            </a:r>
+            <a:r>
+              <a:rPr lang="en-US" sz="2800" dirty="0"/>
+              <a:t>(</a:t>
+            </a:r>
+            <a:r>
+              <a:rPr lang="en-US" sz="2800" dirty="0" err="1"/>
+              <a:t>x,y,z</a:t>
+            </a:r>
+            <a:r>
+              <a:rPr lang="en-US" sz="2800" dirty="0"/>
+              <a:t>)</a:t>
+            </a:r>
+            <a:br>
+              <a:rPr lang="en-US" sz="2800" dirty="0"/>
+            </a:br>
+            <a:r>
+              <a:rPr lang="en-US" sz="2800" dirty="0"/>
+              <a:t>{ </a:t>
+            </a:r>
+            <a:br>
+              <a:rPr lang="en-US" sz="2800" dirty="0"/>
+            </a:br>
+            <a:r>
+              <a:rPr lang="en-US" sz="2800" dirty="0"/>
+              <a:t>  place(10)</a:t>
+            </a:r>
+            <a:r>
+              <a:rPr lang="en-US" sz="2800" dirty="0" err="1"/>
               <a:t>OnStack</a:t>
             </a:r>
             <a:r>
-              <a:rPr lang="en-US" sz="2800" dirty="0" smtClean="0"/>
+              <a:rPr lang="en-US" sz="2800" dirty="0"/>
               <a:t>;</a:t>
             </a:r>
             <a:br>
-              <a:rPr lang="en-US" sz="2800" dirty="0" smtClean="0"/>
+              <a:rPr lang="en-US" sz="2800" dirty="0"/>
             </a:br>
             <a:r>
-              <a:rPr lang="en-US" sz="2800" dirty="0" smtClean="0"/>
+              <a:rPr lang="en-US" sz="2800" dirty="0"/>
               <a:t>  place(45)</a:t>
             </a:r>
             <a:r>
-              <a:rPr lang="en-US" sz="2800" dirty="0" err="1" smtClean="0"/>
+              <a:rPr lang="en-US" sz="2800" dirty="0" err="1"/>
               <a:t>OnStack</a:t>
             </a:r>
             <a:r>
-              <a:rPr lang="en-US" sz="2800" dirty="0" smtClean="0"/>
+              <a:rPr lang="en-US" sz="2800" dirty="0"/>
               <a:t>;</a:t>
             </a:r>
             <a:br>
-              <a:rPr lang="en-US" sz="2800" dirty="0" smtClean="0"/>
+              <a:rPr lang="en-US" sz="2800" dirty="0"/>
             </a:br>
             <a:r>
               <a:rPr lang="en-US" sz="2800" dirty="0"/>
-              <a:t> </a:t>
-            </a:r>
-            <a:r>
-              <a:rPr lang="en-US" sz="2800" dirty="0" smtClean="0"/>
-              <a:t> place(99)</a:t>
-            </a:r>
-            <a:r>
-              <a:rPr lang="en-US" sz="2800" dirty="0" err="1" smtClean="0"/>
+              <a:t>  place(99)</a:t>
+            </a:r>
+            <a:r>
+              <a:rPr lang="en-US" sz="2800" dirty="0" err="1"/>
               <a:t>OnStack</a:t>
             </a:r>
-            <a:r>
-              <a:rPr lang="en-US" sz="2800" dirty="0" smtClean="0"/>
-              <a:t/>
-            </a:r>
             <a:br>
-              <a:rPr lang="en-US" sz="2800" dirty="0" smtClean="0"/>
+              <a:rPr lang="en-US" sz="2800" dirty="0"/>
             </a:br>
             <a:r>
               <a:rPr lang="en-US" sz="2800" dirty="0"/>
-              <a:t> </a:t>
-            </a:r>
-            <a:r>
-              <a:rPr lang="en-US" sz="2800" dirty="0" smtClean="0"/>
-              <a:t> place(3)</a:t>
-            </a:r>
-            <a:r>
-              <a:rPr lang="en-US" sz="2800" dirty="0" err="1" smtClean="0"/>
+              <a:t>  place(3)</a:t>
+            </a:r>
+            <a:r>
+              <a:rPr lang="en-US" sz="2800" dirty="0" err="1"/>
               <a:t>OnStack</a:t>
             </a:r>
             <a:endParaRPr lang="en-CA" sz="2800" dirty="0"/>
@@ -8305,7 +8281,7 @@
           <a:p>
             <a:pPr algn="ctr"/>
             <a:r>
-              <a:rPr lang="en-US" sz="2800" dirty="0" smtClean="0"/>
+              <a:rPr lang="en-US" sz="2800" dirty="0"/>
               <a:t>Return address</a:t>
             </a:r>
             <a:endParaRPr lang="en-CA" sz="2800" dirty="0"/>
@@ -8349,7 +8325,7 @@
           <a:p>
             <a:pPr algn="ctr"/>
             <a:r>
-              <a:rPr lang="en-US" sz="3200" dirty="0" smtClean="0"/>
+              <a:rPr lang="en-US" sz="3200" dirty="0"/>
               <a:t>3</a:t>
             </a:r>
             <a:endParaRPr lang="en-CA" sz="3200" dirty="0"/>
@@ -8393,7 +8369,7 @@
           <a:p>
             <a:pPr algn="ctr"/>
             <a:r>
-              <a:rPr lang="en-US" sz="3200" dirty="0" smtClean="0"/>
+              <a:rPr lang="en-US" sz="3200" dirty="0"/>
               <a:t>10</a:t>
             </a:r>
             <a:endParaRPr lang="en-CA" sz="3200" dirty="0"/>
@@ -8437,7 +8413,7 @@
           <a:p>
             <a:pPr algn="ctr"/>
             <a:r>
-              <a:rPr lang="en-US" sz="2800" dirty="0" smtClean="0"/>
+              <a:rPr lang="en-US" sz="2800" dirty="0"/>
               <a:t>45</a:t>
             </a:r>
             <a:endParaRPr lang="en-CA" sz="2800" dirty="0"/>
@@ -8481,7 +8457,7 @@
           <a:p>
             <a:pPr algn="ctr"/>
             <a:r>
-              <a:rPr lang="en-US" sz="3200" dirty="0" smtClean="0"/>
+              <a:rPr lang="en-US" sz="3200" dirty="0"/>
               <a:t>99</a:t>
             </a:r>
             <a:endParaRPr lang="en-CA" sz="3200" dirty="0"/>
@@ -8569,7 +8545,7 @@
               <a:defRPr/>
             </a:pPr>
             <a:r>
-              <a:rPr kumimoji="0" lang="en-US" sz="4400" b="0" i="0" u="none" strike="noStrike" kern="1200" cap="none" spc="0" normalizeH="0" baseline="0" noProof="0" dirty="0" err="1" smtClean="0">
+              <a:rPr kumimoji="0" lang="en-US" sz="4400" b="0" i="0" u="none" strike="noStrike" kern="1200" cap="none" spc="0" normalizeH="0" baseline="0" noProof="0" dirty="0" err="1">
                 <a:ln>
                   <a:noFill/>
                 </a:ln>
@@ -8586,7 +8562,7 @@
               <a:t>int</a:t>
             </a:r>
             <a:r>
-              <a:rPr kumimoji="0" lang="en-US" sz="4400" b="0" i="0" u="none" strike="noStrike" kern="1200" cap="none" spc="0" normalizeH="0" baseline="0" noProof="0" dirty="0" smtClean="0">
+              <a:rPr kumimoji="0" lang="en-US" sz="4400" b="0" i="0" u="none" strike="noStrike" kern="1200" cap="none" spc="0" normalizeH="0" baseline="0" noProof="0" dirty="0">
                 <a:ln>
                   <a:noFill/>
                 </a:ln>
@@ -8603,7 +8579,7 @@
               <a:t> </a:t>
             </a:r>
             <a:r>
-              <a:rPr kumimoji="0" lang="en-US" sz="4400" b="0" i="0" u="none" strike="noStrike" kern="1200" cap="none" spc="0" normalizeH="0" baseline="0" noProof="0" dirty="0" err="1" smtClean="0">
+              <a:rPr kumimoji="0" lang="en-US" sz="4400" b="0" i="0" u="none" strike="noStrike" kern="1200" cap="none" spc="0" normalizeH="0" baseline="0" noProof="0" dirty="0" err="1">
                 <a:ln>
                   <a:noFill/>
                 </a:ln>
@@ -8620,7 +8596,7 @@
               <a:t>p,q,r</a:t>
             </a:r>
             <a:r>
-              <a:rPr kumimoji="0" lang="en-US" sz="4400" b="0" i="0" u="none" strike="noStrike" kern="1200" cap="none" spc="0" normalizeH="0" baseline="0" noProof="0" dirty="0" smtClean="0">
+              <a:rPr kumimoji="0" lang="en-US" sz="4400" b="0" i="0" u="none" strike="noStrike" kern="1200" cap="none" spc="0" normalizeH="0" baseline="0" noProof="0" dirty="0">
                 <a:ln>
                   <a:noFill/>
                 </a:ln>
@@ -8637,7 +8613,7 @@
               <a:t> = </a:t>
             </a:r>
             <a:r>
-              <a:rPr kumimoji="0" lang="en-US" sz="4400" b="0" i="0" u="none" strike="noStrike" kern="1200" cap="none" spc="0" normalizeH="0" baseline="0" noProof="0" dirty="0" err="1" smtClean="0">
+              <a:rPr kumimoji="0" lang="en-US" sz="4400" b="0" i="0" u="none" strike="noStrike" kern="1200" cap="none" spc="0" normalizeH="0" baseline="0" noProof="0" dirty="0" err="1">
                 <a:ln>
                   <a:noFill/>
                 </a:ln>
@@ -8654,7 +8630,7 @@
               <a:t>doThis</a:t>
             </a:r>
             <a:r>
-              <a:rPr kumimoji="0" lang="en-US" sz="4400" b="0" i="0" u="none" strike="noStrike" kern="1200" cap="none" spc="0" normalizeH="0" baseline="0" noProof="0" dirty="0" smtClean="0">
+              <a:rPr kumimoji="0" lang="en-US" sz="4400" b="0" i="0" u="none" strike="noStrike" kern="1200" cap="none" spc="0" normalizeH="0" baseline="0" noProof="0" dirty="0">
                 <a:ln>
                   <a:noFill/>
                 </a:ln>
@@ -8671,7 +8647,7 @@
               <a:t>( 6, 2, 5 )</a:t>
             </a:r>
             <a:br>
-              <a:rPr kumimoji="0" lang="en-US" sz="4400" b="0" i="0" u="none" strike="noStrike" kern="1200" cap="none" spc="0" normalizeH="0" baseline="0" noProof="0" dirty="0" smtClean="0">
+              <a:rPr kumimoji="0" lang="en-US" sz="4400" b="0" i="0" u="none" strike="noStrike" kern="1200" cap="none" spc="0" normalizeH="0" baseline="0" noProof="0" dirty="0">
                 <a:ln>
                   <a:noFill/>
                 </a:ln>
@@ -8687,7 +8663,7 @@
               </a:rPr>
             </a:br>
             <a:r>
-              <a:rPr kumimoji="0" lang="en-US" sz="4400" b="0" i="0" u="none" strike="noStrike" kern="1200" cap="none" spc="0" normalizeH="0" baseline="0" noProof="0" dirty="0" err="1" smtClean="0">
+              <a:rPr kumimoji="0" lang="en-US" sz="4400" b="0" i="0" u="none" strike="noStrike" kern="1200" cap="none" spc="0" normalizeH="0" baseline="0" noProof="0" dirty="0" err="1">
                 <a:ln>
                   <a:noFill/>
                 </a:ln>
@@ -8704,7 +8680,7 @@
               <a:t>cout</a:t>
             </a:r>
             <a:r>
-              <a:rPr kumimoji="0" lang="en-US" sz="4400" b="0" i="0" u="none" strike="noStrike" kern="1200" cap="none" spc="0" normalizeH="0" baseline="0" noProof="0" dirty="0" smtClean="0">
+              <a:rPr kumimoji="0" lang="en-US" sz="4400" b="0" i="0" u="none" strike="noStrike" kern="1200" cap="none" spc="0" normalizeH="0" baseline="0" noProof="0" dirty="0">
                 <a:ln>
                   <a:noFill/>
                 </a:ln>
@@ -8720,7 +8696,7 @@
               </a:rPr>
               <a:t> &lt;&lt; p;</a:t>
             </a:r>
-            <a:endParaRPr kumimoji="0" lang="en-CA" sz="4400" b="0" i="0" u="none" strike="noStrike" kern="1200" cap="none" spc="0" normalizeH="0" baseline="0" noProof="0" dirty="0" smtClean="0">
+            <a:endParaRPr kumimoji="0" lang="en-CA" sz="4400" b="0" i="0" u="none" strike="noStrike" kern="1200" cap="none" spc="0" normalizeH="0" baseline="0" noProof="0" dirty="0">
               <a:ln>
                 <a:noFill/>
               </a:ln>
@@ -8778,18 +8754,17 @@
           <a:lstStyle/>
           <a:p>
             <a:r>
-              <a:rPr lang="en-CA" dirty="0" smtClean="0"/>
+              <a:rPr lang="en-CA" dirty="0"/>
               <a:t>Using </a:t>
             </a:r>
             <a:r>
-              <a:rPr lang="en-CA" dirty="0" err="1" smtClean="0"/>
+              <a:rPr lang="en-CA" dirty="0" err="1"/>
               <a:t>Lua</a:t>
             </a:r>
             <a:r>
-              <a:rPr lang="en-CA" dirty="0" smtClean="0"/>
+              <a:rPr lang="en-CA" dirty="0"/>
               <a:t> for control…</a:t>
             </a:r>
-            <a:endParaRPr lang="en-CA" dirty="0"/>
           </a:p>
         </p:txBody>
       </p:sp>
@@ -8811,26 +8786,26 @@
           <a:lstStyle/>
           <a:p>
             <a:r>
-              <a:rPr lang="en-CA" dirty="0" smtClean="0"/>
+              <a:rPr lang="en-CA" dirty="0"/>
               <a:t>Luau is a “C” API, so can only integrate to a “function”, not a “method”</a:t>
             </a:r>
           </a:p>
           <a:p>
             <a:r>
-              <a:rPr lang="en-CA" dirty="0" smtClean="0"/>
+              <a:rPr lang="en-CA" dirty="0"/>
               <a:t>What’s the difference? </a:t>
             </a:r>
           </a:p>
           <a:p>
             <a:pPr lvl="1"/>
             <a:r>
-              <a:rPr lang="en-CA" dirty="0" smtClean="0"/>
+              <a:rPr lang="en-CA" dirty="0"/>
               <a:t>A “function” is known at compile time, where a “method” isn’t (though it depends)</a:t>
             </a:r>
           </a:p>
           <a:p>
             <a:r>
-              <a:rPr lang="en-CA" dirty="0" smtClean="0"/>
+              <a:rPr lang="en-CA" dirty="0"/>
               <a:t>A “static method” can be used, though, as it’s known at compile time (but there’s only 1 shared among all class instances)</a:t>
             </a:r>
           </a:p>
@@ -8898,58 +8873,58 @@
           <a:p>
             <a:pPr algn="ctr"/>
             <a:r>
-              <a:rPr lang="en-CA" dirty="0" err="1" smtClean="0"/>
+              <a:rPr lang="en-CA" dirty="0" err="1"/>
               <a:t>vecObjects</a:t>
             </a:r>
-            <a:endParaRPr lang="en-CA" dirty="0" smtClean="0"/>
-          </a:p>
-          <a:p>
-            <a:pPr algn="ctr"/>
-            <a:endParaRPr lang="en-CA" dirty="0"/>
-          </a:p>
-          <a:p>
-            <a:pPr algn="ctr"/>
-            <a:endParaRPr lang="en-CA" dirty="0" smtClean="0"/>
-          </a:p>
-          <a:p>
-            <a:pPr algn="ctr"/>
-            <a:endParaRPr lang="en-CA" dirty="0"/>
-          </a:p>
-          <a:p>
-            <a:pPr algn="ctr"/>
-            <a:endParaRPr lang="en-CA" dirty="0" smtClean="0"/>
-          </a:p>
-          <a:p>
-            <a:pPr algn="ctr"/>
-            <a:endParaRPr lang="en-CA" dirty="0"/>
-          </a:p>
-          <a:p>
-            <a:pPr algn="ctr"/>
-            <a:endParaRPr lang="en-CA" dirty="0" smtClean="0"/>
-          </a:p>
-          <a:p>
-            <a:pPr algn="ctr"/>
-            <a:endParaRPr lang="en-CA" dirty="0"/>
-          </a:p>
-          <a:p>
-            <a:pPr algn="ctr"/>
-            <a:endParaRPr lang="en-CA" dirty="0" smtClean="0"/>
-          </a:p>
-          <a:p>
-            <a:pPr algn="ctr"/>
-            <a:endParaRPr lang="en-CA" dirty="0"/>
-          </a:p>
-          <a:p>
-            <a:pPr algn="ctr"/>
-            <a:endParaRPr lang="en-CA" dirty="0" smtClean="0"/>
-          </a:p>
-          <a:p>
-            <a:pPr algn="ctr"/>
-            <a:endParaRPr lang="en-CA" dirty="0"/>
-          </a:p>
-          <a:p>
-            <a:pPr algn="ctr"/>
-            <a:endParaRPr lang="en-CA" dirty="0" smtClean="0"/>
+            <a:endParaRPr lang="en-CA" dirty="0"/>
+          </a:p>
+          <a:p>
+            <a:pPr algn="ctr"/>
+            <a:endParaRPr lang="en-CA" dirty="0"/>
+          </a:p>
+          <a:p>
+            <a:pPr algn="ctr"/>
+            <a:endParaRPr lang="en-CA" dirty="0"/>
+          </a:p>
+          <a:p>
+            <a:pPr algn="ctr"/>
+            <a:endParaRPr lang="en-CA" dirty="0"/>
+          </a:p>
+          <a:p>
+            <a:pPr algn="ctr"/>
+            <a:endParaRPr lang="en-CA" dirty="0"/>
+          </a:p>
+          <a:p>
+            <a:pPr algn="ctr"/>
+            <a:endParaRPr lang="en-CA" dirty="0"/>
+          </a:p>
+          <a:p>
+            <a:pPr algn="ctr"/>
+            <a:endParaRPr lang="en-CA" dirty="0"/>
+          </a:p>
+          <a:p>
+            <a:pPr algn="ctr"/>
+            <a:endParaRPr lang="en-CA" dirty="0"/>
+          </a:p>
+          <a:p>
+            <a:pPr algn="ctr"/>
+            <a:endParaRPr lang="en-CA" dirty="0"/>
+          </a:p>
+          <a:p>
+            <a:pPr algn="ctr"/>
+            <a:endParaRPr lang="en-CA" dirty="0"/>
+          </a:p>
+          <a:p>
+            <a:pPr algn="ctr"/>
+            <a:endParaRPr lang="en-CA" dirty="0"/>
+          </a:p>
+          <a:p>
+            <a:pPr algn="ctr"/>
+            <a:endParaRPr lang="en-CA" dirty="0"/>
+          </a:p>
+          <a:p>
+            <a:pPr algn="ctr"/>
+            <a:endParaRPr lang="en-CA" dirty="0"/>
           </a:p>
           <a:p>
             <a:pPr algn="ctr"/>
@@ -8998,10 +8973,9 @@
           <a:p>
             <a:pPr algn="ctr"/>
             <a:r>
-              <a:rPr lang="en-CA" dirty="0" smtClean="0"/>
+              <a:rPr lang="en-CA" dirty="0"/>
               <a:t>75</a:t>
             </a:r>
-            <a:endParaRPr lang="en-CA" dirty="0"/>
           </a:p>
         </p:txBody>
       </p:sp>
@@ -9042,10 +9016,9 @@
           <a:p>
             <a:pPr algn="ctr"/>
             <a:r>
-              <a:rPr lang="en-CA" dirty="0" smtClean="0"/>
+              <a:rPr lang="en-CA" dirty="0"/>
               <a:t>56</a:t>
             </a:r>
-            <a:endParaRPr lang="en-CA" dirty="0"/>
           </a:p>
         </p:txBody>
       </p:sp>
@@ -9086,10 +9059,9 @@
           <a:p>
             <a:pPr algn="ctr"/>
             <a:r>
-              <a:rPr lang="en-CA" dirty="0" smtClean="0"/>
+              <a:rPr lang="en-CA" dirty="0"/>
               <a:t>34</a:t>
             </a:r>
-            <a:endParaRPr lang="en-CA" dirty="0"/>
           </a:p>
         </p:txBody>
       </p:sp>
@@ -9130,10 +9102,9 @@
           <a:p>
             <a:pPr algn="ctr"/>
             <a:r>
-              <a:rPr lang="en-CA" dirty="0" smtClean="0"/>
+              <a:rPr lang="en-CA" dirty="0"/>
               <a:t>16</a:t>
             </a:r>
-            <a:endParaRPr lang="en-CA" dirty="0"/>
           </a:p>
         </p:txBody>
       </p:sp>
@@ -9174,21 +9145,20 @@
           <a:p>
             <a:pPr algn="ctr"/>
             <a:r>
-              <a:rPr lang="en-CA" dirty="0" err="1" smtClean="0"/>
+              <a:rPr lang="en-CA" dirty="0" err="1"/>
               <a:t>Lua</a:t>
             </a:r>
             <a:r>
-              <a:rPr lang="en-CA" dirty="0" smtClean="0"/>
+              <a:rPr lang="en-CA" dirty="0"/>
               <a:t> Instance </a:t>
             </a:r>
           </a:p>
           <a:p>
             <a:pPr algn="ctr"/>
             <a:r>
-              <a:rPr lang="en-CA" dirty="0" smtClean="0"/>
+              <a:rPr lang="en-CA" dirty="0"/>
               <a:t>“Brain”</a:t>
             </a:r>
-            <a:endParaRPr lang="en-CA" dirty="0"/>
           </a:p>
         </p:txBody>
       </p:sp>
@@ -9229,14 +9199,13 @@
           <a:p>
             <a:pPr algn="ctr"/>
             <a:r>
-              <a:rPr lang="en-CA" dirty="0" err="1" smtClean="0"/>
+              <a:rPr lang="en-CA" dirty="0" err="1"/>
               <a:t>GetObjectState</a:t>
             </a:r>
             <a:r>
-              <a:rPr lang="en-CA" dirty="0" smtClean="0"/>
+              <a:rPr lang="en-CA" dirty="0"/>
               <a:t>(ID)</a:t>
             </a:r>
-            <a:endParaRPr lang="en-CA" dirty="0"/>
           </a:p>
         </p:txBody>
       </p:sp>
@@ -9277,14 +9246,13 @@
           <a:p>
             <a:pPr algn="ctr"/>
             <a:r>
-              <a:rPr lang="en-CA" dirty="0" err="1" smtClean="0"/>
+              <a:rPr lang="en-CA" dirty="0" err="1"/>
               <a:t>SetObjectState</a:t>
             </a:r>
             <a:r>
-              <a:rPr lang="en-CA" dirty="0" smtClean="0"/>
+              <a:rPr lang="en-CA" dirty="0"/>
               <a:t>(ID)</a:t>
             </a:r>
-            <a:endParaRPr lang="en-CA" dirty="0"/>
           </a:p>
         </p:txBody>
       </p:sp>
@@ -9492,58 +9460,58 @@
           <a:p>
             <a:pPr algn="ctr"/>
             <a:r>
-              <a:rPr lang="en-CA" dirty="0" err="1" smtClean="0"/>
+              <a:rPr lang="en-CA" dirty="0" err="1"/>
               <a:t>vecObjects</a:t>
             </a:r>
-            <a:endParaRPr lang="en-CA" dirty="0" smtClean="0"/>
-          </a:p>
-          <a:p>
-            <a:pPr algn="ctr"/>
-            <a:endParaRPr lang="en-CA" dirty="0"/>
-          </a:p>
-          <a:p>
-            <a:pPr algn="ctr"/>
-            <a:endParaRPr lang="en-CA" dirty="0" smtClean="0"/>
-          </a:p>
-          <a:p>
-            <a:pPr algn="ctr"/>
-            <a:endParaRPr lang="en-CA" dirty="0"/>
-          </a:p>
-          <a:p>
-            <a:pPr algn="ctr"/>
-            <a:endParaRPr lang="en-CA" dirty="0" smtClean="0"/>
-          </a:p>
-          <a:p>
-            <a:pPr algn="ctr"/>
-            <a:endParaRPr lang="en-CA" dirty="0"/>
-          </a:p>
-          <a:p>
-            <a:pPr algn="ctr"/>
-            <a:endParaRPr lang="en-CA" dirty="0" smtClean="0"/>
-          </a:p>
-          <a:p>
-            <a:pPr algn="ctr"/>
-            <a:endParaRPr lang="en-CA" dirty="0"/>
-          </a:p>
-          <a:p>
-            <a:pPr algn="ctr"/>
-            <a:endParaRPr lang="en-CA" dirty="0" smtClean="0"/>
-          </a:p>
-          <a:p>
-            <a:pPr algn="ctr"/>
-            <a:endParaRPr lang="en-CA" dirty="0"/>
-          </a:p>
-          <a:p>
-            <a:pPr algn="ctr"/>
-            <a:endParaRPr lang="en-CA" dirty="0" smtClean="0"/>
-          </a:p>
-          <a:p>
-            <a:pPr algn="ctr"/>
-            <a:endParaRPr lang="en-CA" dirty="0"/>
-          </a:p>
-          <a:p>
-            <a:pPr algn="ctr"/>
-            <a:endParaRPr lang="en-CA" dirty="0" smtClean="0"/>
+            <a:endParaRPr lang="en-CA" dirty="0"/>
+          </a:p>
+          <a:p>
+            <a:pPr algn="ctr"/>
+            <a:endParaRPr lang="en-CA" dirty="0"/>
+          </a:p>
+          <a:p>
+            <a:pPr algn="ctr"/>
+            <a:endParaRPr lang="en-CA" dirty="0"/>
+          </a:p>
+          <a:p>
+            <a:pPr algn="ctr"/>
+            <a:endParaRPr lang="en-CA" dirty="0"/>
+          </a:p>
+          <a:p>
+            <a:pPr algn="ctr"/>
+            <a:endParaRPr lang="en-CA" dirty="0"/>
+          </a:p>
+          <a:p>
+            <a:pPr algn="ctr"/>
+            <a:endParaRPr lang="en-CA" dirty="0"/>
+          </a:p>
+          <a:p>
+            <a:pPr algn="ctr"/>
+            <a:endParaRPr lang="en-CA" dirty="0"/>
+          </a:p>
+          <a:p>
+            <a:pPr algn="ctr"/>
+            <a:endParaRPr lang="en-CA" dirty="0"/>
+          </a:p>
+          <a:p>
+            <a:pPr algn="ctr"/>
+            <a:endParaRPr lang="en-CA" dirty="0"/>
+          </a:p>
+          <a:p>
+            <a:pPr algn="ctr"/>
+            <a:endParaRPr lang="en-CA" dirty="0"/>
+          </a:p>
+          <a:p>
+            <a:pPr algn="ctr"/>
+            <a:endParaRPr lang="en-CA" dirty="0"/>
+          </a:p>
+          <a:p>
+            <a:pPr algn="ctr"/>
+            <a:endParaRPr lang="en-CA" dirty="0"/>
+          </a:p>
+          <a:p>
+            <a:pPr algn="ctr"/>
+            <a:endParaRPr lang="en-CA" dirty="0"/>
           </a:p>
           <a:p>
             <a:pPr algn="ctr"/>
@@ -9752,21 +9720,20 @@
           <a:p>
             <a:pPr algn="ctr"/>
             <a:r>
-              <a:rPr lang="en-CA" dirty="0" err="1" smtClean="0"/>
+              <a:rPr lang="en-CA" dirty="0" err="1"/>
               <a:t>Lua</a:t>
             </a:r>
             <a:r>
-              <a:rPr lang="en-CA" dirty="0" smtClean="0"/>
+              <a:rPr lang="en-CA" dirty="0"/>
               <a:t> Instance </a:t>
             </a:r>
           </a:p>
           <a:p>
             <a:pPr algn="ctr"/>
             <a:r>
-              <a:rPr lang="en-CA" dirty="0" smtClean="0"/>
+              <a:rPr lang="en-CA" dirty="0"/>
               <a:t>“Brain”</a:t>
             </a:r>
-            <a:endParaRPr lang="en-CA" dirty="0"/>
           </a:p>
         </p:txBody>
       </p:sp>
@@ -9873,58 +9840,58 @@
           <a:p>
             <a:pPr algn="ctr"/>
             <a:r>
-              <a:rPr lang="en-CA" dirty="0" err="1" smtClean="0"/>
+              <a:rPr lang="en-CA" dirty="0" err="1"/>
               <a:t>vecObjects</a:t>
             </a:r>
-            <a:endParaRPr lang="en-CA" dirty="0" smtClean="0"/>
-          </a:p>
-          <a:p>
-            <a:pPr algn="ctr"/>
-            <a:endParaRPr lang="en-CA" dirty="0"/>
-          </a:p>
-          <a:p>
-            <a:pPr algn="ctr"/>
-            <a:endParaRPr lang="en-CA" dirty="0" smtClean="0"/>
-          </a:p>
-          <a:p>
-            <a:pPr algn="ctr"/>
-            <a:endParaRPr lang="en-CA" dirty="0"/>
-          </a:p>
-          <a:p>
-            <a:pPr algn="ctr"/>
-            <a:endParaRPr lang="en-CA" dirty="0" smtClean="0"/>
-          </a:p>
-          <a:p>
-            <a:pPr algn="ctr"/>
-            <a:endParaRPr lang="en-CA" dirty="0"/>
-          </a:p>
-          <a:p>
-            <a:pPr algn="ctr"/>
-            <a:endParaRPr lang="en-CA" dirty="0" smtClean="0"/>
-          </a:p>
-          <a:p>
-            <a:pPr algn="ctr"/>
-            <a:endParaRPr lang="en-CA" dirty="0"/>
-          </a:p>
-          <a:p>
-            <a:pPr algn="ctr"/>
-            <a:endParaRPr lang="en-CA" dirty="0" smtClean="0"/>
-          </a:p>
-          <a:p>
-            <a:pPr algn="ctr"/>
-            <a:endParaRPr lang="en-CA" dirty="0"/>
-          </a:p>
-          <a:p>
-            <a:pPr algn="ctr"/>
-            <a:endParaRPr lang="en-CA" dirty="0" smtClean="0"/>
-          </a:p>
-          <a:p>
-            <a:pPr algn="ctr"/>
-            <a:endParaRPr lang="en-CA" dirty="0"/>
-          </a:p>
-          <a:p>
-            <a:pPr algn="ctr"/>
-            <a:endParaRPr lang="en-CA" dirty="0" smtClean="0"/>
+            <a:endParaRPr lang="en-CA" dirty="0"/>
+          </a:p>
+          <a:p>
+            <a:pPr algn="ctr"/>
+            <a:endParaRPr lang="en-CA" dirty="0"/>
+          </a:p>
+          <a:p>
+            <a:pPr algn="ctr"/>
+            <a:endParaRPr lang="en-CA" dirty="0"/>
+          </a:p>
+          <a:p>
+            <a:pPr algn="ctr"/>
+            <a:endParaRPr lang="en-CA" dirty="0"/>
+          </a:p>
+          <a:p>
+            <a:pPr algn="ctr"/>
+            <a:endParaRPr lang="en-CA" dirty="0"/>
+          </a:p>
+          <a:p>
+            <a:pPr algn="ctr"/>
+            <a:endParaRPr lang="en-CA" dirty="0"/>
+          </a:p>
+          <a:p>
+            <a:pPr algn="ctr"/>
+            <a:endParaRPr lang="en-CA" dirty="0"/>
+          </a:p>
+          <a:p>
+            <a:pPr algn="ctr"/>
+            <a:endParaRPr lang="en-CA" dirty="0"/>
+          </a:p>
+          <a:p>
+            <a:pPr algn="ctr"/>
+            <a:endParaRPr lang="en-CA" dirty="0"/>
+          </a:p>
+          <a:p>
+            <a:pPr algn="ctr"/>
+            <a:endParaRPr lang="en-CA" dirty="0"/>
+          </a:p>
+          <a:p>
+            <a:pPr algn="ctr"/>
+            <a:endParaRPr lang="en-CA" dirty="0"/>
+          </a:p>
+          <a:p>
+            <a:pPr algn="ctr"/>
+            <a:endParaRPr lang="en-CA" dirty="0"/>
+          </a:p>
+          <a:p>
+            <a:pPr algn="ctr"/>
+            <a:endParaRPr lang="en-CA" dirty="0"/>
           </a:p>
           <a:p>
             <a:pPr algn="ctr"/>
@@ -9973,10 +9940,9 @@
           <a:p>
             <a:pPr algn="ctr"/>
             <a:r>
-              <a:rPr lang="en-CA" dirty="0" smtClean="0"/>
+              <a:rPr lang="en-CA" dirty="0"/>
               <a:t>ID:2</a:t>
             </a:r>
-            <a:endParaRPr lang="en-CA" dirty="0"/>
           </a:p>
         </p:txBody>
       </p:sp>
@@ -10057,10 +10023,9 @@
           <a:p>
             <a:pPr algn="ctr"/>
             <a:r>
-              <a:rPr lang="en-CA" dirty="0" smtClean="0"/>
+              <a:rPr lang="en-CA" dirty="0"/>
               <a:t>ID:5</a:t>
             </a:r>
-            <a:endParaRPr lang="en-CA" dirty="0"/>
           </a:p>
         </p:txBody>
       </p:sp>
@@ -10141,36 +10106,35 @@
           <a:p>
             <a:pPr algn="ctr"/>
             <a:r>
-              <a:rPr lang="en-CA" dirty="0" err="1" smtClean="0"/>
+              <a:rPr lang="en-CA" dirty="0" err="1"/>
               <a:t>Lua</a:t>
             </a:r>
             <a:r>
-              <a:rPr lang="en-CA" dirty="0" smtClean="0"/>
+              <a:rPr lang="en-CA" dirty="0"/>
               <a:t> Instance </a:t>
             </a:r>
           </a:p>
           <a:p>
             <a:pPr algn="ctr"/>
             <a:r>
-              <a:rPr lang="en-CA" dirty="0" smtClean="0"/>
+              <a:rPr lang="en-CA" dirty="0"/>
               <a:t>“Brain”</a:t>
             </a:r>
           </a:p>
           <a:p>
             <a:pPr algn="ctr"/>
             <a:r>
-              <a:rPr lang="en-CA" dirty="0" smtClean="0"/>
+              <a:rPr lang="en-CA" dirty="0"/>
               <a:t>(</a:t>
             </a:r>
             <a:r>
-              <a:rPr lang="en-CA" dirty="0" err="1" smtClean="0"/>
+              <a:rPr lang="en-CA" dirty="0" err="1"/>
               <a:t>ObjectID</a:t>
             </a:r>
             <a:r>
-              <a:rPr lang="en-CA" dirty="0" smtClean="0"/>
+              <a:rPr lang="en-CA" dirty="0"/>
               <a:t> = 2)</a:t>
             </a:r>
-            <a:endParaRPr lang="en-CA" dirty="0"/>
           </a:p>
         </p:txBody>
       </p:sp>
@@ -10211,15 +10175,15 @@
           <a:p>
             <a:pPr algn="ctr"/>
             <a:r>
-              <a:rPr lang="en-CA" dirty="0" err="1" smtClean="0"/>
+              <a:rPr lang="en-CA" dirty="0" err="1"/>
               <a:t>GetObjectState</a:t>
             </a:r>
             <a:r>
-              <a:rPr lang="en-CA" dirty="0" smtClean="0"/>
+              <a:rPr lang="en-CA" dirty="0"/>
               <a:t>(</a:t>
             </a:r>
             <a:r>
-              <a:rPr lang="en-CA" u="sng" dirty="0" smtClean="0">
+              <a:rPr lang="en-CA" u="sng" dirty="0">
                 <a:solidFill>
                   <a:srgbClr val="FF0000"/>
                 </a:solidFill>
@@ -10227,10 +10191,9 @@
               <a:t>ID</a:t>
             </a:r>
             <a:r>
-              <a:rPr lang="en-CA" dirty="0" smtClean="0"/>
+              <a:rPr lang="en-CA" dirty="0"/>
               <a:t>)</a:t>
             </a:r>
-            <a:endParaRPr lang="en-CA" dirty="0"/>
           </a:p>
         </p:txBody>
       </p:sp>
@@ -10271,14 +10234,13 @@
           <a:p>
             <a:pPr algn="ctr"/>
             <a:r>
-              <a:rPr lang="en-CA" dirty="0" err="1" smtClean="0"/>
+              <a:rPr lang="en-CA" dirty="0" err="1"/>
               <a:t>SetObjectState</a:t>
             </a:r>
             <a:r>
-              <a:rPr lang="en-CA" dirty="0" smtClean="0"/>
+              <a:rPr lang="en-CA" dirty="0"/>
               <a:t>(ID)</a:t>
             </a:r>
-            <a:endParaRPr lang="en-CA" dirty="0"/>
           </a:p>
         </p:txBody>
       </p:sp>
@@ -10461,28 +10423,27 @@
           <a:p>
             <a:pPr algn="ctr"/>
             <a:r>
-              <a:rPr lang="en-CA" dirty="0" err="1" smtClean="0"/>
+              <a:rPr lang="en-CA" dirty="0" err="1"/>
               <a:t>Lua</a:t>
             </a:r>
             <a:r>
-              <a:rPr lang="en-CA" dirty="0" smtClean="0"/>
+              <a:rPr lang="en-CA" dirty="0"/>
               <a:t> Instance </a:t>
             </a:r>
           </a:p>
           <a:p>
             <a:pPr algn="ctr"/>
             <a:r>
-              <a:rPr lang="en-CA" dirty="0" smtClean="0"/>
+              <a:rPr lang="en-CA" dirty="0"/>
               <a:t>“Brain”</a:t>
             </a:r>
           </a:p>
           <a:p>
             <a:pPr algn="ctr"/>
             <a:r>
-              <a:rPr lang="en-CA" dirty="0" smtClean="0"/>
+              <a:rPr lang="en-CA" dirty="0"/>
               <a:t>(for object 5)</a:t>
             </a:r>
-            <a:endParaRPr lang="en-CA" dirty="0"/>
           </a:p>
         </p:txBody>
       </p:sp>
@@ -10692,58 +10653,58 @@
           <a:p>
             <a:pPr algn="ctr"/>
             <a:r>
-              <a:rPr lang="en-CA" dirty="0" err="1" smtClean="0"/>
+              <a:rPr lang="en-CA" dirty="0" err="1"/>
               <a:t>vecObjects</a:t>
             </a:r>
-            <a:endParaRPr lang="en-CA" dirty="0" smtClean="0"/>
-          </a:p>
-          <a:p>
-            <a:pPr algn="ctr"/>
-            <a:endParaRPr lang="en-CA" dirty="0"/>
-          </a:p>
-          <a:p>
-            <a:pPr algn="ctr"/>
-            <a:endParaRPr lang="en-CA" dirty="0" smtClean="0"/>
-          </a:p>
-          <a:p>
-            <a:pPr algn="ctr"/>
-            <a:endParaRPr lang="en-CA" dirty="0"/>
-          </a:p>
-          <a:p>
-            <a:pPr algn="ctr"/>
-            <a:endParaRPr lang="en-CA" dirty="0" smtClean="0"/>
-          </a:p>
-          <a:p>
-            <a:pPr algn="ctr"/>
-            <a:endParaRPr lang="en-CA" dirty="0"/>
-          </a:p>
-          <a:p>
-            <a:pPr algn="ctr"/>
-            <a:endParaRPr lang="en-CA" dirty="0" smtClean="0"/>
-          </a:p>
-          <a:p>
-            <a:pPr algn="ctr"/>
-            <a:endParaRPr lang="en-CA" dirty="0"/>
-          </a:p>
-          <a:p>
-            <a:pPr algn="ctr"/>
-            <a:endParaRPr lang="en-CA" dirty="0" smtClean="0"/>
-          </a:p>
-          <a:p>
-            <a:pPr algn="ctr"/>
-            <a:endParaRPr lang="en-CA" dirty="0"/>
-          </a:p>
-          <a:p>
-            <a:pPr algn="ctr"/>
-            <a:endParaRPr lang="en-CA" dirty="0" smtClean="0"/>
-          </a:p>
-          <a:p>
-            <a:pPr algn="ctr"/>
-            <a:endParaRPr lang="en-CA" dirty="0"/>
-          </a:p>
-          <a:p>
-            <a:pPr algn="ctr"/>
-            <a:endParaRPr lang="en-CA" dirty="0" smtClean="0"/>
+            <a:endParaRPr lang="en-CA" dirty="0"/>
+          </a:p>
+          <a:p>
+            <a:pPr algn="ctr"/>
+            <a:endParaRPr lang="en-CA" dirty="0"/>
+          </a:p>
+          <a:p>
+            <a:pPr algn="ctr"/>
+            <a:endParaRPr lang="en-CA" dirty="0"/>
+          </a:p>
+          <a:p>
+            <a:pPr algn="ctr"/>
+            <a:endParaRPr lang="en-CA" dirty="0"/>
+          </a:p>
+          <a:p>
+            <a:pPr algn="ctr"/>
+            <a:endParaRPr lang="en-CA" dirty="0"/>
+          </a:p>
+          <a:p>
+            <a:pPr algn="ctr"/>
+            <a:endParaRPr lang="en-CA" dirty="0"/>
+          </a:p>
+          <a:p>
+            <a:pPr algn="ctr"/>
+            <a:endParaRPr lang="en-CA" dirty="0"/>
+          </a:p>
+          <a:p>
+            <a:pPr algn="ctr"/>
+            <a:endParaRPr lang="en-CA" dirty="0"/>
+          </a:p>
+          <a:p>
+            <a:pPr algn="ctr"/>
+            <a:endParaRPr lang="en-CA" dirty="0"/>
+          </a:p>
+          <a:p>
+            <a:pPr algn="ctr"/>
+            <a:endParaRPr lang="en-CA" dirty="0"/>
+          </a:p>
+          <a:p>
+            <a:pPr algn="ctr"/>
+            <a:endParaRPr lang="en-CA" dirty="0"/>
+          </a:p>
+          <a:p>
+            <a:pPr algn="ctr"/>
+            <a:endParaRPr lang="en-CA" dirty="0"/>
+          </a:p>
+          <a:p>
+            <a:pPr algn="ctr"/>
+            <a:endParaRPr lang="en-CA" dirty="0"/>
           </a:p>
           <a:p>
             <a:pPr algn="ctr"/>
@@ -10952,21 +10913,20 @@
           <a:p>
             <a:pPr algn="ctr"/>
             <a:r>
-              <a:rPr lang="en-CA" dirty="0" err="1" smtClean="0"/>
+              <a:rPr lang="en-CA" dirty="0" err="1"/>
               <a:t>Lua</a:t>
             </a:r>
             <a:r>
-              <a:rPr lang="en-CA" dirty="0" smtClean="0"/>
+              <a:rPr lang="en-CA" dirty="0"/>
               <a:t> Instance </a:t>
             </a:r>
           </a:p>
           <a:p>
             <a:pPr algn="ctr"/>
             <a:r>
-              <a:rPr lang="en-CA" dirty="0" smtClean="0"/>
+              <a:rPr lang="en-CA" dirty="0"/>
               <a:t>“Brain”</a:t>
             </a:r>
-            <a:endParaRPr lang="en-CA" dirty="0"/>
           </a:p>
         </p:txBody>
       </p:sp>
@@ -11015,6 +10975,51 @@
         <p:spPr>
           <a:xfrm>
             <a:off x="3733800" y="1123950"/>
+            <a:ext cx="2133600" cy="457200"/>
+          </a:xfrm>
+          <a:prstGeom prst="rect">
+            <a:avLst/>
+          </a:prstGeom>
+        </p:spPr>
+        <p:style>
+          <a:lnRef idx="3">
+            <a:schemeClr val="lt1"/>
+          </a:lnRef>
+          <a:fillRef idx="1">
+            <a:schemeClr val="accent2"/>
+          </a:fillRef>
+          <a:effectRef idx="1">
+            <a:schemeClr val="accent2"/>
+          </a:effectRef>
+          <a:fontRef idx="minor">
+            <a:schemeClr val="lt1"/>
+          </a:fontRef>
+        </p:style>
+        <p:txBody>
+          <a:bodyPr rtlCol="0" anchor="ctr"/>
+          <a:lstStyle/>
+          <a:p>
+            <a:pPr algn="ctr"/>
+            <a:r>
+              <a:rPr lang="en-CA" dirty="0" err="1"/>
+              <a:t>GetObjectState</a:t>
+            </a:r>
+            <a:r>
+              <a:rPr lang="en-CA" dirty="0"/>
+              <a:t>()</a:t>
+            </a:r>
+          </a:p>
+        </p:txBody>
+      </p:sp>
+      <p:sp>
+        <p:nvSpPr>
+          <p:cNvPr id="29" name="Rectangle 28"/>
+          <p:cNvSpPr/>
+          <p:nvPr/>
+        </p:nvSpPr>
+        <p:spPr>
+          <a:xfrm>
+            <a:off x="3733800" y="1657350"/>
             <a:ext cx="2133600" cy="457200"/>
           </a:xfrm>
           <a:prstGeom prst="rect">
@@ -11043,62 +11048,13 @@
           <a:p>
             <a:pPr algn="ctr"/>
             <a:r>
-              <a:rPr lang="en-CA" dirty="0" err="1" smtClean="0"/>
-              <a:t>GetObjectState</a:t>
-            </a:r>
-            <a:r>
-              <a:rPr lang="en-CA" dirty="0" smtClean="0"/>
+              <a:rPr lang="en-CA" dirty="0" err="1"/>
+              <a:t>SetObjectState</a:t>
+            </a:r>
+            <a:r>
+              <a:rPr lang="en-CA" dirty="0"/>
               <a:t>()</a:t>
             </a:r>
-            <a:endParaRPr lang="en-CA" dirty="0"/>
-          </a:p>
-        </p:txBody>
-      </p:sp>
-      <p:sp>
-        <p:nvSpPr>
-          <p:cNvPr id="29" name="Rectangle 28"/>
-          <p:cNvSpPr/>
-          <p:nvPr/>
-        </p:nvSpPr>
-        <p:spPr>
-          <a:xfrm>
-            <a:off x="3733800" y="1657350"/>
-            <a:ext cx="2133600" cy="457200"/>
-          </a:xfrm>
-          <a:prstGeom prst="rect">
-            <a:avLst/>
-          </a:prstGeom>
-        </p:spPr>
-        <p:style>
-          <a:lnRef idx="2">
-            <a:schemeClr val="accent1">
-              <a:shade val="50000"/>
-            </a:schemeClr>
-          </a:lnRef>
-          <a:fillRef idx="1">
-            <a:schemeClr val="accent1"/>
-          </a:fillRef>
-          <a:effectRef idx="0">
-            <a:schemeClr val="accent1"/>
-          </a:effectRef>
-          <a:fontRef idx="minor">
-            <a:schemeClr val="lt1"/>
-          </a:fontRef>
-        </p:style>
-        <p:txBody>
-          <a:bodyPr rtlCol="0" anchor="ctr"/>
-          <a:lstStyle/>
-          <a:p>
-            <a:pPr algn="ctr"/>
-            <a:r>
-              <a:rPr lang="en-CA" dirty="0" err="1" smtClean="0"/>
-              <a:t>SetObjectState</a:t>
-            </a:r>
-            <a:r>
-              <a:rPr lang="en-CA" dirty="0" smtClean="0"/>
-              <a:t>()</a:t>
-            </a:r>
-            <a:endParaRPr lang="en-CA" dirty="0"/>
           </a:p>
         </p:txBody>
       </p:sp>
@@ -11282,21 +11238,20 @@
           <a:p>
             <a:pPr algn="ctr"/>
             <a:r>
-              <a:rPr lang="en-CA" dirty="0" err="1" smtClean="0"/>
+              <a:rPr lang="en-CA" dirty="0" err="1"/>
               <a:t>Lua</a:t>
             </a:r>
             <a:r>
-              <a:rPr lang="en-CA" dirty="0" smtClean="0"/>
+              <a:rPr lang="en-CA" dirty="0"/>
               <a:t> Instance </a:t>
             </a:r>
           </a:p>
           <a:p>
             <a:pPr algn="ctr"/>
             <a:r>
-              <a:rPr lang="en-CA" dirty="0" smtClean="0"/>
+              <a:rPr lang="en-CA" dirty="0"/>
               <a:t>“Brain”</a:t>
             </a:r>
-            <a:endParaRPr lang="en-CA" dirty="0"/>
           </a:p>
         </p:txBody>
       </p:sp>
@@ -11344,6 +11299,51 @@
         <p:spPr>
           <a:xfrm>
             <a:off x="4114800" y="2952750"/>
+            <a:ext cx="2133600" cy="457200"/>
+          </a:xfrm>
+          <a:prstGeom prst="rect">
+            <a:avLst/>
+          </a:prstGeom>
+        </p:spPr>
+        <p:style>
+          <a:lnRef idx="3">
+            <a:schemeClr val="lt1"/>
+          </a:lnRef>
+          <a:fillRef idx="1">
+            <a:schemeClr val="accent2"/>
+          </a:fillRef>
+          <a:effectRef idx="1">
+            <a:schemeClr val="accent2"/>
+          </a:effectRef>
+          <a:fontRef idx="minor">
+            <a:schemeClr val="lt1"/>
+          </a:fontRef>
+        </p:style>
+        <p:txBody>
+          <a:bodyPr rtlCol="0" anchor="ctr"/>
+          <a:lstStyle/>
+          <a:p>
+            <a:pPr algn="ctr"/>
+            <a:r>
+              <a:rPr lang="en-CA" dirty="0" err="1"/>
+              <a:t>GetObjectState</a:t>
+            </a:r>
+            <a:r>
+              <a:rPr lang="en-CA" dirty="0"/>
+              <a:t>()</a:t>
+            </a:r>
+          </a:p>
+        </p:txBody>
+      </p:sp>
+      <p:sp>
+        <p:nvSpPr>
+          <p:cNvPr id="52" name="Rectangle 51"/>
+          <p:cNvSpPr/>
+          <p:nvPr/>
+        </p:nvSpPr>
+        <p:spPr>
+          <a:xfrm>
+            <a:off x="4114800" y="3486150"/>
             <a:ext cx="2133600" cy="457200"/>
           </a:xfrm>
           <a:prstGeom prst="rect">
@@ -11372,62 +11372,13 @@
           <a:p>
             <a:pPr algn="ctr"/>
             <a:r>
-              <a:rPr lang="en-CA" dirty="0" err="1" smtClean="0"/>
-              <a:t>GetObjectState</a:t>
-            </a:r>
-            <a:r>
-              <a:rPr lang="en-CA" dirty="0" smtClean="0"/>
+              <a:rPr lang="en-CA" dirty="0" err="1"/>
+              <a:t>SetObjectState</a:t>
+            </a:r>
+            <a:r>
+              <a:rPr lang="en-CA" dirty="0"/>
               <a:t>()</a:t>
             </a:r>
-            <a:endParaRPr lang="en-CA" dirty="0"/>
-          </a:p>
-        </p:txBody>
-      </p:sp>
-      <p:sp>
-        <p:nvSpPr>
-          <p:cNvPr id="52" name="Rectangle 51"/>
-          <p:cNvSpPr/>
-          <p:nvPr/>
-        </p:nvSpPr>
-        <p:spPr>
-          <a:xfrm>
-            <a:off x="4114800" y="3486150"/>
-            <a:ext cx="2133600" cy="457200"/>
-          </a:xfrm>
-          <a:prstGeom prst="rect">
-            <a:avLst/>
-          </a:prstGeom>
-        </p:spPr>
-        <p:style>
-          <a:lnRef idx="2">
-            <a:schemeClr val="accent1">
-              <a:shade val="50000"/>
-            </a:schemeClr>
-          </a:lnRef>
-          <a:fillRef idx="1">
-            <a:schemeClr val="accent1"/>
-          </a:fillRef>
-          <a:effectRef idx="0">
-            <a:schemeClr val="accent1"/>
-          </a:effectRef>
-          <a:fontRef idx="minor">
-            <a:schemeClr val="lt1"/>
-          </a:fontRef>
-        </p:style>
-        <p:txBody>
-          <a:bodyPr rtlCol="0" anchor="ctr"/>
-          <a:lstStyle/>
-          <a:p>
-            <a:pPr algn="ctr"/>
-            <a:r>
-              <a:rPr lang="en-CA" dirty="0" err="1" smtClean="0"/>
-              <a:t>SetObjectState</a:t>
-            </a:r>
-            <a:r>
-              <a:rPr lang="en-CA" dirty="0" smtClean="0"/>
-              <a:t>()</a:t>
-            </a:r>
-            <a:endParaRPr lang="en-CA" dirty="0"/>
           </a:p>
         </p:txBody>
       </p:sp>
@@ -11623,14 +11574,13 @@
           <a:lstStyle/>
           <a:p>
             <a:r>
-              <a:rPr lang="en-CA" dirty="0" err="1" smtClean="0"/>
+              <a:rPr lang="en-CA" dirty="0" err="1"/>
               <a:t>Lua</a:t>
             </a:r>
             <a:r>
-              <a:rPr lang="en-CA" dirty="0" smtClean="0"/>
+              <a:rPr lang="en-CA" dirty="0"/>
               <a:t> tables</a:t>
             </a:r>
-            <a:endParaRPr lang="en-CA" dirty="0"/>
           </a:p>
         </p:txBody>
       </p:sp>
@@ -11657,20 +11607,20 @@
           <a:lstStyle/>
           <a:p>
             <a:r>
-              <a:rPr lang="en-US" dirty="0" smtClean="0"/>
+              <a:rPr lang="en-US" dirty="0"/>
               <a:t>Only “container” type, can mimic almost any other common container</a:t>
             </a:r>
           </a:p>
           <a:p>
             <a:r>
-              <a:rPr lang="en-US" dirty="0" smtClean="0"/>
+              <a:rPr lang="en-US" dirty="0"/>
               <a:t>They are “associative arrays”:</a:t>
             </a:r>
           </a:p>
           <a:p>
             <a:pPr lvl="1"/>
             <a:r>
-              <a:rPr lang="en-US" dirty="0" smtClean="0"/>
+              <a:rPr lang="en-US" dirty="0"/>
               <a:t>Arrays that use anything as an index (like PHP)</a:t>
             </a:r>
           </a:p>
@@ -11678,7 +11628,7 @@
             <a:pPr>
               <a:buNone/>
             </a:pPr>
-            <a:endParaRPr lang="en-CA" dirty="0" smtClean="0"/>
+            <a:endParaRPr lang="en-CA" dirty="0"/>
           </a:p>
           <a:p>
             <a:endParaRPr lang="en-CA" dirty="0"/>
@@ -11759,21 +11709,21 @@
           <a:p>
             <a:pPr algn="ctr"/>
             <a:r>
-              <a:rPr lang="en-US" dirty="0" smtClean="0"/>
+              <a:rPr lang="en-US" dirty="0"/>
               <a:t>a = {}</a:t>
             </a:r>
           </a:p>
           <a:p>
             <a:pPr algn="ctr"/>
             <a:r>
-              <a:rPr lang="en-US" dirty="0" smtClean="0"/>
+              <a:rPr lang="en-US" dirty="0"/>
               <a:t>K = a</a:t>
             </a:r>
           </a:p>
           <a:p>
             <a:pPr algn="ctr"/>
             <a:r>
-              <a:rPr lang="en-US" dirty="0" smtClean="0"/>
+              <a:rPr lang="en-US" dirty="0"/>
               <a:t>a = nil</a:t>
             </a:r>
             <a:endParaRPr lang="en-CA" dirty="0"/>
@@ -11817,21 +11767,21 @@
           <a:p>
             <a:pPr algn="ctr"/>
             <a:r>
-              <a:rPr lang="en-US" dirty="0" smtClean="0"/>
+              <a:rPr lang="en-US" dirty="0"/>
               <a:t>a[5] = 10</a:t>
             </a:r>
           </a:p>
           <a:p>
             <a:pPr algn="ctr"/>
             <a:r>
-              <a:rPr lang="en-US" dirty="0" smtClean="0"/>
+              <a:rPr lang="en-US" dirty="0"/>
               <a:t>a[5]  = “Yolo”</a:t>
             </a:r>
           </a:p>
           <a:p>
             <a:pPr algn="ctr"/>
             <a:r>
-              <a:rPr lang="en-US" dirty="0" smtClean="0"/>
+              <a:rPr lang="en-US" dirty="0"/>
               <a:t>a[“5”] = 10</a:t>
             </a:r>
           </a:p>
@@ -11874,17 +11824,17 @@
           <a:p>
             <a:pPr algn="ctr"/>
             <a:r>
-              <a:rPr lang="en-US" dirty="0" smtClean="0"/>
+              <a:rPr lang="en-US" dirty="0"/>
               <a:t>a[“Yolo”] = 17</a:t>
             </a:r>
           </a:p>
           <a:p>
             <a:pPr algn="ctr"/>
             <a:r>
-              <a:rPr lang="en-US" dirty="0" smtClean="0"/>
+              <a:rPr lang="en-US" dirty="0"/>
               <a:t>A[“Yolo”] = a[“Yolo”] + 1</a:t>
             </a:r>
-            <a:endParaRPr lang="en-CA" dirty="0" smtClean="0"/>
+            <a:endParaRPr lang="en-CA" dirty="0"/>
           </a:p>
         </p:txBody>
       </p:sp>

</xml_diff>